<commit_message>
Update itk asic presentation 22_06.pptx
</commit_message>
<xml_diff>
--- a/itk asic presentation 22_06.pptx
+++ b/itk asic presentation 22_06.pptx
@@ -5,16 +5,17 @@
     <p:sldMasterId id="2147483708" r:id="rId1"/>
   </p:sldMasterIdLst>
   <p:notesMasterIdLst>
-    <p:notesMasterId r:id="rId9"/>
+    <p:notesMasterId r:id="rId10"/>
   </p:notesMasterIdLst>
   <p:sldIdLst>
     <p:sldId id="256" r:id="rId2"/>
-    <p:sldId id="257" r:id="rId3"/>
-    <p:sldId id="258" r:id="rId4"/>
-    <p:sldId id="260" r:id="rId5"/>
-    <p:sldId id="259" r:id="rId6"/>
-    <p:sldId id="261" r:id="rId7"/>
-    <p:sldId id="262" r:id="rId8"/>
+    <p:sldId id="263" r:id="rId3"/>
+    <p:sldId id="257" r:id="rId4"/>
+    <p:sldId id="258" r:id="rId5"/>
+    <p:sldId id="260" r:id="rId6"/>
+    <p:sldId id="259" r:id="rId7"/>
+    <p:sldId id="261" r:id="rId8"/>
+    <p:sldId id="262" r:id="rId9"/>
   </p:sldIdLst>
   <p:sldSz cx="12192000" cy="6858000"/>
   <p:notesSz cx="6858000" cy="9144000"/>
@@ -222,7 +223,7 @@
           <a:p>
             <a:fld id="{63D444C9-B5A1-44A4-B3D2-4390C992AE2D}" type="datetimeFigureOut">
               <a:rPr lang="en-US" smtClean="0"/>
-              <a:t>6/20/2023</a:t>
+              <a:t>6/22/2023</a:t>
             </a:fld>
             <a:endParaRPr lang="en-US"/>
           </a:p>
@@ -4499,7 +4500,7 @@
           <p:cNvPr id="2" name="Title 1">
             <a:extLst>
               <a:ext uri="{FF2B5EF4-FFF2-40B4-BE49-F238E27FC236}">
-                <a16:creationId xmlns:a16="http://schemas.microsoft.com/office/drawing/2014/main" id="{8A4AAC7A-F091-1088-DCE1-AEEC91D8F333}"/>
+                <a16:creationId xmlns:a16="http://schemas.microsoft.com/office/drawing/2014/main" id="{7376064F-FADE-7830-9267-1E08D35AD9E6}"/>
               </a:ext>
             </a:extLst>
           </p:cNvPr>
@@ -4517,11 +4518,25 @@
           <a:p>
             <a:pPr algn="ctr"/>
             <a:r>
+              <a:rPr lang="de-DE" dirty="0">
+                <a:latin typeface="Times New Roman" panose="02020603050405020304" pitchFamily="18" charset="0"/>
+                <a:cs typeface="Times New Roman" panose="02020603050405020304" pitchFamily="18" charset="0"/>
+              </a:rPr>
+              <a:t>Table </a:t>
+            </a:r>
+            <a:r>
               <a:rPr lang="de-DE" dirty="0" err="1">
                 <a:latin typeface="Times New Roman" panose="02020603050405020304" pitchFamily="18" charset="0"/>
                 <a:cs typeface="Times New Roman" panose="02020603050405020304" pitchFamily="18" charset="0"/>
               </a:rPr>
-              <a:t>Overview</a:t>
+              <a:t>of</a:t>
+            </a:r>
+            <a:r>
+              <a:rPr lang="de-DE" dirty="0">
+                <a:latin typeface="Times New Roman" panose="02020603050405020304" pitchFamily="18" charset="0"/>
+                <a:cs typeface="Times New Roman" panose="02020603050405020304" pitchFamily="18" charset="0"/>
+              </a:rPr>
+              <a:t> Contents</a:t>
             </a:r>
             <a:endParaRPr lang="en-US" dirty="0">
               <a:latin typeface="Times New Roman" panose="02020603050405020304" pitchFamily="18" charset="0"/>
@@ -4535,7 +4550,7 @@
           <p:cNvPr id="3" name="Content Placeholder 2">
             <a:extLst>
               <a:ext uri="{FF2B5EF4-FFF2-40B4-BE49-F238E27FC236}">
-                <a16:creationId xmlns:a16="http://schemas.microsoft.com/office/drawing/2014/main" id="{88D4CFBC-F0F2-8A3D-3203-005734440AC3}"/>
+                <a16:creationId xmlns:a16="http://schemas.microsoft.com/office/drawing/2014/main" id="{AB4984DE-5FE0-DA20-9D62-1F58897C197B}"/>
               </a:ext>
             </a:extLst>
           </p:cNvPr>
@@ -4550,652 +4565,6 @@
         <p:txBody>
           <a:bodyPr/>
           <a:lstStyle/>
-          <a:p>
-            <a:pPr>
-              <a:buFont typeface="Arial" panose="020B0604020202020204" pitchFamily="34" charset="0"/>
-              <a:buChar char="•"/>
-            </a:pPr>
-            <a:endParaRPr lang="de-DE" dirty="0">
-              <a:latin typeface="Times New Roman" panose="02020603050405020304" pitchFamily="18" charset="0"/>
-              <a:cs typeface="Times New Roman" panose="02020603050405020304" pitchFamily="18" charset="0"/>
-            </a:endParaRPr>
-          </a:p>
-          <a:p>
-            <a:pPr>
-              <a:buFont typeface="Arial" panose="020B0604020202020204" pitchFamily="34" charset="0"/>
-              <a:buChar char="•"/>
-            </a:pPr>
-            <a:r>
-              <a:rPr lang="de-DE" dirty="0">
-                <a:latin typeface="Times New Roman" panose="02020603050405020304" pitchFamily="18" charset="0"/>
-                <a:cs typeface="Times New Roman" panose="02020603050405020304" pitchFamily="18" charset="0"/>
-              </a:rPr>
-              <a:t> </a:t>
-            </a:r>
-            <a:r>
-              <a:rPr lang="de-DE" dirty="0" err="1">
-                <a:latin typeface="Times New Roman" panose="02020603050405020304" pitchFamily="18" charset="0"/>
-                <a:cs typeface="Times New Roman" panose="02020603050405020304" pitchFamily="18" charset="0"/>
-              </a:rPr>
-              <a:t>Converts</a:t>
-            </a:r>
-            <a:r>
-              <a:rPr lang="de-DE" dirty="0">
-                <a:latin typeface="Times New Roman" panose="02020603050405020304" pitchFamily="18" charset="0"/>
-                <a:cs typeface="Times New Roman" panose="02020603050405020304" pitchFamily="18" charset="0"/>
-              </a:rPr>
-              <a:t> </a:t>
-            </a:r>
-            <a:r>
-              <a:rPr lang="de-DE" dirty="0" err="1">
-                <a:latin typeface="Times New Roman" panose="02020603050405020304" pitchFamily="18" charset="0"/>
-                <a:cs typeface="Times New Roman" panose="02020603050405020304" pitchFamily="18" charset="0"/>
-              </a:rPr>
-              <a:t>between</a:t>
-            </a:r>
-            <a:r>
-              <a:rPr lang="de-DE" dirty="0">
-                <a:latin typeface="Times New Roman" panose="02020603050405020304" pitchFamily="18" charset="0"/>
-                <a:cs typeface="Times New Roman" panose="02020603050405020304" pitchFamily="18" charset="0"/>
-              </a:rPr>
-              <a:t> </a:t>
-            </a:r>
-            <a:r>
-              <a:rPr lang="de-DE" dirty="0" err="1">
-                <a:latin typeface="Times New Roman" panose="02020603050405020304" pitchFamily="18" charset="0"/>
-                <a:cs typeface="Times New Roman" panose="02020603050405020304" pitchFamily="18" charset="0"/>
-              </a:rPr>
-              <a:t>output</a:t>
-            </a:r>
-            <a:r>
-              <a:rPr lang="de-DE" dirty="0">
-                <a:latin typeface="Times New Roman" panose="02020603050405020304" pitchFamily="18" charset="0"/>
-                <a:cs typeface="Times New Roman" panose="02020603050405020304" pitchFamily="18" charset="0"/>
-              </a:rPr>
-              <a:t> </a:t>
-            </a:r>
-            <a:r>
-              <a:rPr lang="de-DE" dirty="0" err="1">
-                <a:latin typeface="Times New Roman" panose="02020603050405020304" pitchFamily="18" charset="0"/>
-                <a:cs typeface="Times New Roman" panose="02020603050405020304" pitchFamily="18" charset="0"/>
-              </a:rPr>
-              <a:t>signal</a:t>
-            </a:r>
-            <a:r>
-              <a:rPr lang="de-DE" dirty="0">
-                <a:latin typeface="Times New Roman" panose="02020603050405020304" pitchFamily="18" charset="0"/>
-                <a:cs typeface="Times New Roman" panose="02020603050405020304" pitchFamily="18" charset="0"/>
-              </a:rPr>
-              <a:t> (</a:t>
-            </a:r>
-            <a:r>
-              <a:rPr lang="de-DE" dirty="0" err="1">
-                <a:latin typeface="Times New Roman" panose="02020603050405020304" pitchFamily="18" charset="0"/>
-                <a:cs typeface="Times New Roman" panose="02020603050405020304" pitchFamily="18" charset="0"/>
-              </a:rPr>
-              <a:t>register</a:t>
-            </a:r>
-            <a:r>
-              <a:rPr lang="de-DE" dirty="0">
-                <a:latin typeface="Times New Roman" panose="02020603050405020304" pitchFamily="18" charset="0"/>
-                <a:cs typeface="Times New Roman" panose="02020603050405020304" pitchFamily="18" charset="0"/>
-              </a:rPr>
-              <a:t> </a:t>
-            </a:r>
-            <a:r>
-              <a:rPr lang="de-DE" dirty="0" err="1">
-                <a:latin typeface="Times New Roman" panose="02020603050405020304" pitchFamily="18" charset="0"/>
-                <a:cs typeface="Times New Roman" panose="02020603050405020304" pitchFamily="18" charset="0"/>
-              </a:rPr>
-              <a:t>content</a:t>
-            </a:r>
-            <a:r>
-              <a:rPr lang="de-DE" dirty="0">
-                <a:latin typeface="Times New Roman" panose="02020603050405020304" pitchFamily="18" charset="0"/>
-                <a:cs typeface="Times New Roman" panose="02020603050405020304" pitchFamily="18" charset="0"/>
-              </a:rPr>
-              <a:t>) and </a:t>
-            </a:r>
-            <a:r>
-              <a:rPr lang="de-DE" dirty="0" err="1">
-                <a:latin typeface="Times New Roman" panose="02020603050405020304" pitchFamily="18" charset="0"/>
-                <a:cs typeface="Times New Roman" panose="02020603050405020304" pitchFamily="18" charset="0"/>
-              </a:rPr>
-              <a:t>readout</a:t>
-            </a:r>
-            <a:r>
-              <a:rPr lang="de-DE" dirty="0">
-                <a:latin typeface="Times New Roman" panose="02020603050405020304" pitchFamily="18" charset="0"/>
-                <a:cs typeface="Times New Roman" panose="02020603050405020304" pitchFamily="18" charset="0"/>
-              </a:rPr>
-              <a:t> </a:t>
-            </a:r>
-            <a:r>
-              <a:rPr lang="de-DE" dirty="0" err="1">
-                <a:latin typeface="Times New Roman" panose="02020603050405020304" pitchFamily="18" charset="0"/>
-                <a:cs typeface="Times New Roman" panose="02020603050405020304" pitchFamily="18" charset="0"/>
-              </a:rPr>
-              <a:t>information</a:t>
-            </a:r>
-            <a:r>
-              <a:rPr lang="de-DE" dirty="0">
-                <a:latin typeface="Times New Roman" panose="02020603050405020304" pitchFamily="18" charset="0"/>
-                <a:cs typeface="Times New Roman" panose="02020603050405020304" pitchFamily="18" charset="0"/>
-              </a:rPr>
-              <a:t> </a:t>
-            </a:r>
-            <a:r>
-              <a:rPr lang="de-DE" dirty="0" err="1">
-                <a:latin typeface="Times New Roman" panose="02020603050405020304" pitchFamily="18" charset="0"/>
-                <a:cs typeface="Times New Roman" panose="02020603050405020304" pitchFamily="18" charset="0"/>
-              </a:rPr>
-              <a:t>for</a:t>
-            </a:r>
-            <a:r>
-              <a:rPr lang="de-DE" dirty="0">
-                <a:latin typeface="Times New Roman" panose="02020603050405020304" pitchFamily="18" charset="0"/>
-                <a:cs typeface="Times New Roman" panose="02020603050405020304" pitchFamily="18" charset="0"/>
-              </a:rPr>
-              <a:t> </a:t>
-            </a:r>
-            <a:r>
-              <a:rPr lang="de-DE" dirty="0" err="1">
-                <a:latin typeface="Times New Roman" panose="02020603050405020304" pitchFamily="18" charset="0"/>
-                <a:cs typeface="Times New Roman" panose="02020603050405020304" pitchFamily="18" charset="0"/>
-              </a:rPr>
-              <a:t>each</a:t>
-            </a:r>
-            <a:r>
-              <a:rPr lang="de-DE" dirty="0">
-                <a:latin typeface="Times New Roman" panose="02020603050405020304" pitchFamily="18" charset="0"/>
-                <a:cs typeface="Times New Roman" panose="02020603050405020304" pitchFamily="18" charset="0"/>
-              </a:rPr>
-              <a:t> </a:t>
-            </a:r>
-            <a:r>
-              <a:rPr lang="de-DE" dirty="0" err="1">
-                <a:latin typeface="Times New Roman" panose="02020603050405020304" pitchFamily="18" charset="0"/>
-                <a:cs typeface="Times New Roman" panose="02020603050405020304" pitchFamily="18" charset="0"/>
-              </a:rPr>
-              <a:t>register</a:t>
-            </a:r>
-            <a:endParaRPr lang="de-DE" dirty="0">
-              <a:latin typeface="Times New Roman" panose="02020603050405020304" pitchFamily="18" charset="0"/>
-              <a:cs typeface="Times New Roman" panose="02020603050405020304" pitchFamily="18" charset="0"/>
-            </a:endParaRPr>
-          </a:p>
-          <a:p>
-            <a:pPr>
-              <a:buFont typeface="Arial" panose="020B0604020202020204" pitchFamily="34" charset="0"/>
-              <a:buChar char="•"/>
-            </a:pPr>
-            <a:r>
-              <a:rPr lang="de-DE" dirty="0">
-                <a:latin typeface="Times New Roman" panose="02020603050405020304" pitchFamily="18" charset="0"/>
-                <a:cs typeface="Times New Roman" panose="02020603050405020304" pitchFamily="18" charset="0"/>
-              </a:rPr>
-              <a:t> Can </a:t>
-            </a:r>
-            <a:r>
-              <a:rPr lang="de-DE" dirty="0" err="1">
-                <a:latin typeface="Times New Roman" panose="02020603050405020304" pitchFamily="18" charset="0"/>
-                <a:cs typeface="Times New Roman" panose="02020603050405020304" pitchFamily="18" charset="0"/>
-              </a:rPr>
-              <a:t>input</a:t>
-            </a:r>
-            <a:r>
-              <a:rPr lang="de-DE" dirty="0">
-                <a:latin typeface="Times New Roman" panose="02020603050405020304" pitchFamily="18" charset="0"/>
-                <a:cs typeface="Times New Roman" panose="02020603050405020304" pitchFamily="18" charset="0"/>
-              </a:rPr>
-              <a:t> </a:t>
-            </a:r>
-            <a:r>
-              <a:rPr lang="de-DE" dirty="0" err="1">
-                <a:latin typeface="Times New Roman" panose="02020603050405020304" pitchFamily="18" charset="0"/>
-                <a:cs typeface="Times New Roman" panose="02020603050405020304" pitchFamily="18" charset="0"/>
-              </a:rPr>
-              <a:t>binary</a:t>
-            </a:r>
-            <a:r>
-              <a:rPr lang="de-DE" dirty="0">
-                <a:latin typeface="Times New Roman" panose="02020603050405020304" pitchFamily="18" charset="0"/>
-                <a:cs typeface="Times New Roman" panose="02020603050405020304" pitchFamily="18" charset="0"/>
-              </a:rPr>
-              <a:t>, </a:t>
-            </a:r>
-            <a:r>
-              <a:rPr lang="de-DE" dirty="0" err="1">
-                <a:latin typeface="Times New Roman" panose="02020603050405020304" pitchFamily="18" charset="0"/>
-                <a:cs typeface="Times New Roman" panose="02020603050405020304" pitchFamily="18" charset="0"/>
-              </a:rPr>
-              <a:t>hexadecimal</a:t>
-            </a:r>
-            <a:r>
-              <a:rPr lang="de-DE" dirty="0">
-                <a:latin typeface="Times New Roman" panose="02020603050405020304" pitchFamily="18" charset="0"/>
-                <a:cs typeface="Times New Roman" panose="02020603050405020304" pitchFamily="18" charset="0"/>
-              </a:rPr>
-              <a:t>, </a:t>
-            </a:r>
-            <a:r>
-              <a:rPr lang="de-DE" dirty="0" err="1">
-                <a:latin typeface="Times New Roman" panose="02020603050405020304" pitchFamily="18" charset="0"/>
-                <a:cs typeface="Times New Roman" panose="02020603050405020304" pitchFamily="18" charset="0"/>
-              </a:rPr>
-              <a:t>or</a:t>
-            </a:r>
-            <a:r>
-              <a:rPr lang="de-DE" dirty="0">
-                <a:latin typeface="Times New Roman" panose="02020603050405020304" pitchFamily="18" charset="0"/>
-                <a:cs typeface="Times New Roman" panose="02020603050405020304" pitchFamily="18" charset="0"/>
-              </a:rPr>
-              <a:t> </a:t>
-            </a:r>
-            <a:r>
-              <a:rPr lang="de-DE" dirty="0" err="1">
-                <a:latin typeface="Times New Roman" panose="02020603050405020304" pitchFamily="18" charset="0"/>
-                <a:cs typeface="Times New Roman" panose="02020603050405020304" pitchFamily="18" charset="0"/>
-              </a:rPr>
-              <a:t>decimal</a:t>
-            </a:r>
-            <a:r>
-              <a:rPr lang="de-DE" dirty="0">
-                <a:latin typeface="Times New Roman" panose="02020603050405020304" pitchFamily="18" charset="0"/>
-                <a:cs typeface="Times New Roman" panose="02020603050405020304" pitchFamily="18" charset="0"/>
-              </a:rPr>
-              <a:t> </a:t>
-            </a:r>
-            <a:r>
-              <a:rPr lang="de-DE" dirty="0" err="1">
-                <a:latin typeface="Times New Roman" panose="02020603050405020304" pitchFamily="18" charset="0"/>
-                <a:cs typeface="Times New Roman" panose="02020603050405020304" pitchFamily="18" charset="0"/>
-              </a:rPr>
-              <a:t>signal</a:t>
-            </a:r>
-            <a:endParaRPr lang="de-DE" dirty="0">
-              <a:latin typeface="Times New Roman" panose="02020603050405020304" pitchFamily="18" charset="0"/>
-              <a:cs typeface="Times New Roman" panose="02020603050405020304" pitchFamily="18" charset="0"/>
-            </a:endParaRPr>
-          </a:p>
-          <a:p>
-            <a:pPr>
-              <a:buFont typeface="Arial" panose="020B0604020202020204" pitchFamily="34" charset="0"/>
-              <a:buChar char="•"/>
-            </a:pPr>
-            <a:r>
-              <a:rPr lang="de-DE" dirty="0">
-                <a:latin typeface="Times New Roman" panose="02020603050405020304" pitchFamily="18" charset="0"/>
-                <a:cs typeface="Times New Roman" panose="02020603050405020304" pitchFamily="18" charset="0"/>
-              </a:rPr>
-              <a:t> Update: </a:t>
-            </a:r>
-            <a:r>
-              <a:rPr lang="de-DE" dirty="0" err="1">
-                <a:latin typeface="Times New Roman" panose="02020603050405020304" pitchFamily="18" charset="0"/>
-                <a:cs typeface="Times New Roman" panose="02020603050405020304" pitchFamily="18" charset="0"/>
-              </a:rPr>
-              <a:t>can</a:t>
-            </a:r>
-            <a:r>
-              <a:rPr lang="de-DE" dirty="0">
-                <a:latin typeface="Times New Roman" panose="02020603050405020304" pitchFamily="18" charset="0"/>
-                <a:cs typeface="Times New Roman" panose="02020603050405020304" pitchFamily="18" charset="0"/>
-              </a:rPr>
-              <a:t> </a:t>
-            </a:r>
-            <a:r>
-              <a:rPr lang="de-DE" dirty="0" err="1">
-                <a:latin typeface="Times New Roman" panose="02020603050405020304" pitchFamily="18" charset="0"/>
-                <a:cs typeface="Times New Roman" panose="02020603050405020304" pitchFamily="18" charset="0"/>
-              </a:rPr>
-              <a:t>now</a:t>
-            </a:r>
-            <a:r>
-              <a:rPr lang="de-DE" dirty="0">
-                <a:latin typeface="Times New Roman" panose="02020603050405020304" pitchFamily="18" charset="0"/>
-                <a:cs typeface="Times New Roman" panose="02020603050405020304" pitchFamily="18" charset="0"/>
-              </a:rPr>
-              <a:t> </a:t>
-            </a:r>
-            <a:r>
-              <a:rPr lang="de-DE" dirty="0" err="1">
-                <a:latin typeface="Times New Roman" panose="02020603050405020304" pitchFamily="18" charset="0"/>
-                <a:cs typeface="Times New Roman" panose="02020603050405020304" pitchFamily="18" charset="0"/>
-              </a:rPr>
-              <a:t>select</a:t>
-            </a:r>
-            <a:r>
-              <a:rPr lang="de-DE" dirty="0">
-                <a:latin typeface="Times New Roman" panose="02020603050405020304" pitchFamily="18" charset="0"/>
-                <a:cs typeface="Times New Roman" panose="02020603050405020304" pitchFamily="18" charset="0"/>
-              </a:rPr>
-              <a:t> </a:t>
-            </a:r>
-            <a:r>
-              <a:rPr lang="de-DE" dirty="0" err="1">
-                <a:latin typeface="Times New Roman" panose="02020603050405020304" pitchFamily="18" charset="0"/>
-                <a:cs typeface="Times New Roman" panose="02020603050405020304" pitchFamily="18" charset="0"/>
-              </a:rPr>
-              <a:t>registers</a:t>
-            </a:r>
-            <a:r>
-              <a:rPr lang="de-DE" dirty="0">
-                <a:latin typeface="Times New Roman" panose="02020603050405020304" pitchFamily="18" charset="0"/>
-                <a:cs typeface="Times New Roman" panose="02020603050405020304" pitchFamily="18" charset="0"/>
-              </a:rPr>
-              <a:t> </a:t>
-            </a:r>
-            <a:r>
-              <a:rPr lang="de-DE" dirty="0" err="1">
-                <a:latin typeface="Times New Roman" panose="02020603050405020304" pitchFamily="18" charset="0"/>
-                <a:cs typeface="Times New Roman" panose="02020603050405020304" pitchFamily="18" charset="0"/>
-              </a:rPr>
-              <a:t>by</a:t>
-            </a:r>
-            <a:r>
-              <a:rPr lang="de-DE" dirty="0">
-                <a:latin typeface="Times New Roman" panose="02020603050405020304" pitchFamily="18" charset="0"/>
-                <a:cs typeface="Times New Roman" panose="02020603050405020304" pitchFamily="18" charset="0"/>
-              </a:rPr>
-              <a:t> </a:t>
-            </a:r>
-            <a:r>
-              <a:rPr lang="de-DE" dirty="0" err="1">
-                <a:latin typeface="Times New Roman" panose="02020603050405020304" pitchFamily="18" charset="0"/>
-                <a:cs typeface="Times New Roman" panose="02020603050405020304" pitchFamily="18" charset="0"/>
-              </a:rPr>
-              <a:t>name</a:t>
-            </a:r>
-            <a:r>
-              <a:rPr lang="de-DE" dirty="0">
-                <a:latin typeface="Times New Roman" panose="02020603050405020304" pitchFamily="18" charset="0"/>
-                <a:cs typeface="Times New Roman" panose="02020603050405020304" pitchFamily="18" charset="0"/>
-              </a:rPr>
-              <a:t>, and </a:t>
-            </a:r>
-            <a:r>
-              <a:rPr lang="de-DE" dirty="0" err="1">
-                <a:latin typeface="Times New Roman" panose="02020603050405020304" pitchFamily="18" charset="0"/>
-                <a:cs typeface="Times New Roman" panose="02020603050405020304" pitchFamily="18" charset="0"/>
-              </a:rPr>
-              <a:t>hexadecimal</a:t>
-            </a:r>
-            <a:r>
-              <a:rPr lang="de-DE" dirty="0">
-                <a:latin typeface="Times New Roman" panose="02020603050405020304" pitchFamily="18" charset="0"/>
-                <a:cs typeface="Times New Roman" panose="02020603050405020304" pitchFamily="18" charset="0"/>
-              </a:rPr>
-              <a:t> </a:t>
-            </a:r>
-            <a:r>
-              <a:rPr lang="de-DE" dirty="0" err="1">
-                <a:latin typeface="Times New Roman" panose="02020603050405020304" pitchFamily="18" charset="0"/>
-                <a:cs typeface="Times New Roman" panose="02020603050405020304" pitchFamily="18" charset="0"/>
-              </a:rPr>
-              <a:t>number</a:t>
-            </a:r>
-            <a:r>
-              <a:rPr lang="de-DE" dirty="0">
-                <a:latin typeface="Times New Roman" panose="02020603050405020304" pitchFamily="18" charset="0"/>
-                <a:cs typeface="Times New Roman" panose="02020603050405020304" pitchFamily="18" charset="0"/>
-              </a:rPr>
-              <a:t> in </a:t>
-            </a:r>
-            <a:r>
-              <a:rPr lang="de-DE" dirty="0" err="1">
-                <a:latin typeface="Times New Roman" panose="02020603050405020304" pitchFamily="18" charset="0"/>
-                <a:cs typeface="Times New Roman" panose="02020603050405020304" pitchFamily="18" charset="0"/>
-              </a:rPr>
-              <a:t>addition</a:t>
-            </a:r>
-            <a:r>
-              <a:rPr lang="de-DE" dirty="0">
-                <a:latin typeface="Times New Roman" panose="02020603050405020304" pitchFamily="18" charset="0"/>
-                <a:cs typeface="Times New Roman" panose="02020603050405020304" pitchFamily="18" charset="0"/>
-              </a:rPr>
-              <a:t> </a:t>
-            </a:r>
-            <a:r>
-              <a:rPr lang="de-DE" dirty="0" err="1">
-                <a:latin typeface="Times New Roman" panose="02020603050405020304" pitchFamily="18" charset="0"/>
-                <a:cs typeface="Times New Roman" panose="02020603050405020304" pitchFamily="18" charset="0"/>
-              </a:rPr>
-              <a:t>to</a:t>
-            </a:r>
-            <a:r>
-              <a:rPr lang="de-DE" dirty="0">
-                <a:latin typeface="Times New Roman" panose="02020603050405020304" pitchFamily="18" charset="0"/>
-                <a:cs typeface="Times New Roman" panose="02020603050405020304" pitchFamily="18" charset="0"/>
-              </a:rPr>
-              <a:t> </a:t>
-            </a:r>
-            <a:r>
-              <a:rPr lang="de-DE" dirty="0" err="1">
-                <a:latin typeface="Times New Roman" panose="02020603050405020304" pitchFamily="18" charset="0"/>
-                <a:cs typeface="Times New Roman" panose="02020603050405020304" pitchFamily="18" charset="0"/>
-              </a:rPr>
-              <a:t>decimal</a:t>
-            </a:r>
-            <a:r>
-              <a:rPr lang="de-DE" dirty="0">
-                <a:latin typeface="Times New Roman" panose="02020603050405020304" pitchFamily="18" charset="0"/>
-                <a:cs typeface="Times New Roman" panose="02020603050405020304" pitchFamily="18" charset="0"/>
-              </a:rPr>
-              <a:t> </a:t>
-            </a:r>
-            <a:r>
-              <a:rPr lang="de-DE" dirty="0" err="1">
-                <a:latin typeface="Times New Roman" panose="02020603050405020304" pitchFamily="18" charset="0"/>
-                <a:cs typeface="Times New Roman" panose="02020603050405020304" pitchFamily="18" charset="0"/>
-              </a:rPr>
-              <a:t>number</a:t>
-            </a:r>
-            <a:endParaRPr lang="de-DE" dirty="0">
-              <a:latin typeface="Times New Roman" panose="02020603050405020304" pitchFamily="18" charset="0"/>
-              <a:cs typeface="Times New Roman" panose="02020603050405020304" pitchFamily="18" charset="0"/>
-            </a:endParaRPr>
-          </a:p>
-          <a:p>
-            <a:pPr>
-              <a:buFont typeface="Arial" panose="020B0604020202020204" pitchFamily="34" charset="0"/>
-              <a:buChar char="•"/>
-            </a:pPr>
-            <a:r>
-              <a:rPr lang="de-DE" dirty="0">
-                <a:latin typeface="Times New Roman" panose="02020603050405020304" pitchFamily="18" charset="0"/>
-                <a:cs typeface="Times New Roman" panose="02020603050405020304" pitchFamily="18" charset="0"/>
-              </a:rPr>
-              <a:t> Update </a:t>
-            </a:r>
-            <a:r>
-              <a:rPr lang="de-DE" dirty="0" err="1">
-                <a:latin typeface="Times New Roman" panose="02020603050405020304" pitchFamily="18" charset="0"/>
-                <a:cs typeface="Times New Roman" panose="02020603050405020304" pitchFamily="18" charset="0"/>
-              </a:rPr>
-              <a:t>to</a:t>
-            </a:r>
-            <a:r>
-              <a:rPr lang="de-DE" dirty="0">
-                <a:latin typeface="Times New Roman" panose="02020603050405020304" pitchFamily="18" charset="0"/>
-                <a:cs typeface="Times New Roman" panose="02020603050405020304" pitchFamily="18" charset="0"/>
-              </a:rPr>
-              <a:t> </a:t>
-            </a:r>
-            <a:r>
-              <a:rPr lang="de-DE" dirty="0" err="1">
-                <a:latin typeface="Times New Roman" panose="02020603050405020304" pitchFamily="18" charset="0"/>
-                <a:cs typeface="Times New Roman" panose="02020603050405020304" pitchFamily="18" charset="0"/>
-              </a:rPr>
-              <a:t>new</a:t>
-            </a:r>
-            <a:r>
-              <a:rPr lang="de-DE" dirty="0">
-                <a:latin typeface="Times New Roman" panose="02020603050405020304" pitchFamily="18" charset="0"/>
-                <a:cs typeface="Times New Roman" panose="02020603050405020304" pitchFamily="18" charset="0"/>
-              </a:rPr>
-              <a:t> </a:t>
-            </a:r>
-            <a:r>
-              <a:rPr lang="de-DE" dirty="0" err="1">
-                <a:latin typeface="Times New Roman" panose="02020603050405020304" pitchFamily="18" charset="0"/>
-                <a:cs typeface="Times New Roman" panose="02020603050405020304" pitchFamily="18" charset="0"/>
-              </a:rPr>
-              <a:t>register</a:t>
-            </a:r>
-            <a:r>
-              <a:rPr lang="de-DE" dirty="0">
-                <a:latin typeface="Times New Roman" panose="02020603050405020304" pitchFamily="18" charset="0"/>
-                <a:cs typeface="Times New Roman" panose="02020603050405020304" pitchFamily="18" charset="0"/>
-              </a:rPr>
-              <a:t> </a:t>
-            </a:r>
-            <a:r>
-              <a:rPr lang="de-DE" dirty="0" err="1">
-                <a:latin typeface="Times New Roman" panose="02020603050405020304" pitchFamily="18" charset="0"/>
-                <a:cs typeface="Times New Roman" panose="02020603050405020304" pitchFamily="18" charset="0"/>
-              </a:rPr>
-              <a:t>maps</a:t>
-            </a:r>
-            <a:r>
-              <a:rPr lang="de-DE" dirty="0">
-                <a:latin typeface="Times New Roman" panose="02020603050405020304" pitchFamily="18" charset="0"/>
-                <a:cs typeface="Times New Roman" panose="02020603050405020304" pitchFamily="18" charset="0"/>
-              </a:rPr>
-              <a:t> </a:t>
-            </a:r>
-            <a:r>
-              <a:rPr lang="de-DE" dirty="0" err="1">
-                <a:latin typeface="Times New Roman" panose="02020603050405020304" pitchFamily="18" charset="0"/>
-                <a:cs typeface="Times New Roman" panose="02020603050405020304" pitchFamily="18" charset="0"/>
-              </a:rPr>
-              <a:t>for</a:t>
-            </a:r>
-            <a:r>
-              <a:rPr lang="de-DE" dirty="0">
-                <a:latin typeface="Times New Roman" panose="02020603050405020304" pitchFamily="18" charset="0"/>
-                <a:cs typeface="Times New Roman" panose="02020603050405020304" pitchFamily="18" charset="0"/>
-              </a:rPr>
-              <a:t> </a:t>
-            </a:r>
-            <a:r>
-              <a:rPr lang="de-DE" dirty="0" err="1">
-                <a:latin typeface="Times New Roman" panose="02020603050405020304" pitchFamily="18" charset="0"/>
-                <a:cs typeface="Times New Roman" panose="02020603050405020304" pitchFamily="18" charset="0"/>
-              </a:rPr>
-              <a:t>ABCStar</a:t>
-            </a:r>
-            <a:r>
-              <a:rPr lang="de-DE" dirty="0">
-                <a:latin typeface="Times New Roman" panose="02020603050405020304" pitchFamily="18" charset="0"/>
-                <a:cs typeface="Times New Roman" panose="02020603050405020304" pitchFamily="18" charset="0"/>
-              </a:rPr>
-              <a:t> v1, </a:t>
-            </a:r>
-            <a:r>
-              <a:rPr lang="de-DE" dirty="0" err="1">
-                <a:latin typeface="Times New Roman" panose="02020603050405020304" pitchFamily="18" charset="0"/>
-                <a:cs typeface="Times New Roman" panose="02020603050405020304" pitchFamily="18" charset="0"/>
-              </a:rPr>
-              <a:t>HCCStar</a:t>
-            </a:r>
-            <a:r>
-              <a:rPr lang="de-DE" dirty="0">
-                <a:latin typeface="Times New Roman" panose="02020603050405020304" pitchFamily="18" charset="0"/>
-                <a:cs typeface="Times New Roman" panose="02020603050405020304" pitchFamily="18" charset="0"/>
-              </a:rPr>
-              <a:t> v1, and </a:t>
-            </a:r>
-            <a:r>
-              <a:rPr lang="de-DE" dirty="0" err="1">
-                <a:latin typeface="Times New Roman" panose="02020603050405020304" pitchFamily="18" charset="0"/>
-                <a:cs typeface="Times New Roman" panose="02020603050405020304" pitchFamily="18" charset="0"/>
-              </a:rPr>
-              <a:t>AMACStar</a:t>
-            </a:r>
-            <a:endParaRPr lang="de-DE" dirty="0">
-              <a:latin typeface="Times New Roman" panose="02020603050405020304" pitchFamily="18" charset="0"/>
-              <a:cs typeface="Times New Roman" panose="02020603050405020304" pitchFamily="18" charset="0"/>
-            </a:endParaRPr>
-          </a:p>
-          <a:p>
-            <a:pPr>
-              <a:buFont typeface="Arial" panose="020B0604020202020204" pitchFamily="34" charset="0"/>
-              <a:buChar char="•"/>
-            </a:pPr>
-            <a:r>
-              <a:rPr lang="de-DE" dirty="0">
-                <a:latin typeface="Times New Roman" panose="02020603050405020304" pitchFamily="18" charset="0"/>
-                <a:cs typeface="Times New Roman" panose="02020603050405020304" pitchFamily="18" charset="0"/>
-              </a:rPr>
-              <a:t> Old </a:t>
-            </a:r>
-            <a:r>
-              <a:rPr lang="de-DE" dirty="0" err="1">
-                <a:latin typeface="Times New Roman" panose="02020603050405020304" pitchFamily="18" charset="0"/>
-                <a:cs typeface="Times New Roman" panose="02020603050405020304" pitchFamily="18" charset="0"/>
-              </a:rPr>
-              <a:t>version</a:t>
-            </a:r>
-            <a:r>
-              <a:rPr lang="de-DE" dirty="0">
-                <a:latin typeface="Times New Roman" panose="02020603050405020304" pitchFamily="18" charset="0"/>
-                <a:cs typeface="Times New Roman" panose="02020603050405020304" pitchFamily="18" charset="0"/>
-              </a:rPr>
-              <a:t>: </a:t>
-            </a:r>
-            <a:r>
-              <a:rPr lang="de-DE" dirty="0">
-                <a:latin typeface="Times New Roman" panose="02020603050405020304" pitchFamily="18" charset="0"/>
-                <a:cs typeface="Times New Roman" panose="02020603050405020304" pitchFamily="18" charset="0"/>
-                <a:hlinkClick r:id="rId2"/>
-              </a:rPr>
-              <a:t>http://www.hep.upenn.edu/ATLAS_upgrade/ITk/ASICs/Registers.html</a:t>
-            </a:r>
-            <a:endParaRPr lang="de-DE" dirty="0">
-              <a:latin typeface="Times New Roman" panose="02020603050405020304" pitchFamily="18" charset="0"/>
-              <a:cs typeface="Times New Roman" panose="02020603050405020304" pitchFamily="18" charset="0"/>
-            </a:endParaRPr>
-          </a:p>
-          <a:p>
-            <a:pPr>
-              <a:buFont typeface="Arial" panose="020B0604020202020204" pitchFamily="34" charset="0"/>
-              <a:buChar char="•"/>
-            </a:pPr>
-            <a:r>
-              <a:rPr lang="de-DE" dirty="0">
-                <a:latin typeface="Times New Roman" panose="02020603050405020304" pitchFamily="18" charset="0"/>
-                <a:cs typeface="Times New Roman" panose="02020603050405020304" pitchFamily="18" charset="0"/>
-              </a:rPr>
-              <a:t> New </a:t>
-            </a:r>
-            <a:r>
-              <a:rPr lang="de-DE" dirty="0" err="1">
-                <a:latin typeface="Times New Roman" panose="02020603050405020304" pitchFamily="18" charset="0"/>
-                <a:cs typeface="Times New Roman" panose="02020603050405020304" pitchFamily="18" charset="0"/>
-              </a:rPr>
-              <a:t>version</a:t>
-            </a:r>
-            <a:r>
-              <a:rPr lang="de-DE" dirty="0">
-                <a:latin typeface="Times New Roman" panose="02020603050405020304" pitchFamily="18" charset="0"/>
-                <a:cs typeface="Times New Roman" panose="02020603050405020304" pitchFamily="18" charset="0"/>
-              </a:rPr>
-              <a:t>: </a:t>
-            </a:r>
-            <a:r>
-              <a:rPr lang="en-GB" dirty="0">
-                <a:latin typeface="Times New Roman" panose="02020603050405020304" pitchFamily="18" charset="0"/>
-                <a:cs typeface="Times New Roman" panose="02020603050405020304" pitchFamily="18" charset="0"/>
-                <a:hlinkClick r:id="rId3"/>
-              </a:rPr>
-              <a:t>https://github.com/gretagoldberg/Register_Converter.git</a:t>
-            </a:r>
-            <a:endParaRPr lang="en-GB" dirty="0">
-              <a:latin typeface="Times New Roman" panose="02020603050405020304" pitchFamily="18" charset="0"/>
-              <a:cs typeface="Times New Roman" panose="02020603050405020304" pitchFamily="18" charset="0"/>
-            </a:endParaRPr>
-          </a:p>
           <a:p>
             <a:pPr marL="0" indent="0">
               <a:buNone/>
@@ -5210,6 +4579,109 @@
               <a:buFont typeface="Arial" panose="020B0604020202020204" pitchFamily="34" charset="0"/>
               <a:buChar char="•"/>
             </a:pPr>
+            <a:r>
+              <a:rPr lang="de-DE" dirty="0">
+                <a:latin typeface="Times New Roman" panose="02020603050405020304" pitchFamily="18" charset="0"/>
+                <a:cs typeface="Times New Roman" panose="02020603050405020304" pitchFamily="18" charset="0"/>
+              </a:rPr>
+              <a:t> </a:t>
+            </a:r>
+            <a:r>
+              <a:rPr lang="de-DE" dirty="0" err="1">
+                <a:latin typeface="Times New Roman" panose="02020603050405020304" pitchFamily="18" charset="0"/>
+                <a:cs typeface="Times New Roman" panose="02020603050405020304" pitchFamily="18" charset="0"/>
+              </a:rPr>
+              <a:t>Overview</a:t>
+            </a:r>
+            <a:endParaRPr lang="de-DE" dirty="0">
+              <a:latin typeface="Times New Roman" panose="02020603050405020304" pitchFamily="18" charset="0"/>
+              <a:cs typeface="Times New Roman" panose="02020603050405020304" pitchFamily="18" charset="0"/>
+            </a:endParaRPr>
+          </a:p>
+          <a:p>
+            <a:pPr>
+              <a:buFont typeface="Arial" panose="020B0604020202020204" pitchFamily="34" charset="0"/>
+              <a:buChar char="•"/>
+            </a:pPr>
+            <a:r>
+              <a:rPr lang="de-DE" dirty="0">
+                <a:latin typeface="Times New Roman" panose="02020603050405020304" pitchFamily="18" charset="0"/>
+                <a:cs typeface="Times New Roman" panose="02020603050405020304" pitchFamily="18" charset="0"/>
+              </a:rPr>
+              <a:t> Register Interface</a:t>
+            </a:r>
+          </a:p>
+          <a:p>
+            <a:pPr>
+              <a:buFont typeface="Arial" panose="020B0604020202020204" pitchFamily="34" charset="0"/>
+              <a:buChar char="•"/>
+            </a:pPr>
+            <a:r>
+              <a:rPr lang="de-DE" dirty="0">
+                <a:latin typeface="Times New Roman" panose="02020603050405020304" pitchFamily="18" charset="0"/>
+                <a:cs typeface="Times New Roman" panose="02020603050405020304" pitchFamily="18" charset="0"/>
+              </a:rPr>
+              <a:t> </a:t>
+            </a:r>
+            <a:r>
+              <a:rPr lang="de-DE" dirty="0" err="1">
+                <a:latin typeface="Times New Roman" panose="02020603050405020304" pitchFamily="18" charset="0"/>
+                <a:cs typeface="Times New Roman" panose="02020603050405020304" pitchFamily="18" charset="0"/>
+              </a:rPr>
+              <a:t>ABCStar</a:t>
+            </a:r>
+            <a:r>
+              <a:rPr lang="de-DE" dirty="0">
+                <a:latin typeface="Times New Roman" panose="02020603050405020304" pitchFamily="18" charset="0"/>
+                <a:cs typeface="Times New Roman" panose="02020603050405020304" pitchFamily="18" charset="0"/>
+              </a:rPr>
+              <a:t> v1 </a:t>
+            </a:r>
+            <a:r>
+              <a:rPr lang="de-DE" dirty="0" err="1">
+                <a:latin typeface="Times New Roman" panose="02020603050405020304" pitchFamily="18" charset="0"/>
+                <a:cs typeface="Times New Roman" panose="02020603050405020304" pitchFamily="18" charset="0"/>
+              </a:rPr>
+              <a:t>Example</a:t>
+            </a:r>
+            <a:endParaRPr lang="de-DE" dirty="0">
+              <a:latin typeface="Times New Roman" panose="02020603050405020304" pitchFamily="18" charset="0"/>
+              <a:cs typeface="Times New Roman" panose="02020603050405020304" pitchFamily="18" charset="0"/>
+            </a:endParaRPr>
+          </a:p>
+          <a:p>
+            <a:pPr>
+              <a:buFont typeface="Arial" panose="020B0604020202020204" pitchFamily="34" charset="0"/>
+              <a:buChar char="•"/>
+            </a:pPr>
+            <a:r>
+              <a:rPr lang="de-DE" dirty="0">
+                <a:latin typeface="Times New Roman" panose="02020603050405020304" pitchFamily="18" charset="0"/>
+                <a:cs typeface="Times New Roman" panose="02020603050405020304" pitchFamily="18" charset="0"/>
+              </a:rPr>
+              <a:t> </a:t>
+            </a:r>
+            <a:r>
+              <a:rPr lang="de-DE" dirty="0" err="1">
+                <a:latin typeface="Times New Roman" panose="02020603050405020304" pitchFamily="18" charset="0"/>
+                <a:cs typeface="Times New Roman" panose="02020603050405020304" pitchFamily="18" charset="0"/>
+              </a:rPr>
+              <a:t>HCCStar</a:t>
+            </a:r>
+            <a:r>
+              <a:rPr lang="de-DE" dirty="0">
+                <a:latin typeface="Times New Roman" panose="02020603050405020304" pitchFamily="18" charset="0"/>
+                <a:cs typeface="Times New Roman" panose="02020603050405020304" pitchFamily="18" charset="0"/>
+              </a:rPr>
+              <a:t> v1 </a:t>
+            </a:r>
+            <a:r>
+              <a:rPr lang="de-DE" dirty="0" err="1">
+                <a:latin typeface="Times New Roman" panose="02020603050405020304" pitchFamily="18" charset="0"/>
+                <a:cs typeface="Times New Roman" panose="02020603050405020304" pitchFamily="18" charset="0"/>
+              </a:rPr>
+              <a:t>Example</a:t>
+            </a:r>
             <a:endParaRPr lang="en-US" dirty="0">
               <a:latin typeface="Times New Roman" panose="02020603050405020304" pitchFamily="18" charset="0"/>
               <a:cs typeface="Times New Roman" panose="02020603050405020304" pitchFamily="18" charset="0"/>
@@ -5222,7 +4694,7 @@
           <p:cNvPr id="4" name="Date Placeholder 3">
             <a:extLst>
               <a:ext uri="{FF2B5EF4-FFF2-40B4-BE49-F238E27FC236}">
-                <a16:creationId xmlns:a16="http://schemas.microsoft.com/office/drawing/2014/main" id="{FD60694C-C5EA-2B37-2CE9-900A7CB6FBF7}"/>
+                <a16:creationId xmlns:a16="http://schemas.microsoft.com/office/drawing/2014/main" id="{F3544FF7-FCBD-A368-9141-244564D672D1}"/>
               </a:ext>
             </a:extLst>
           </p:cNvPr>
@@ -5239,11 +4711,89 @@
           <a:lstStyle/>
           <a:p>
             <a:r>
-              <a:rPr lang="en-US">
-                <a:latin typeface="Times New Roman" panose="02020603050405020304" pitchFamily="18" charset="0"/>
-                <a:cs typeface="Times New Roman" panose="02020603050405020304" pitchFamily="18" charset="0"/>
-              </a:rPr>
-              <a:t>22.06.2023</a:t>
+              <a:rPr lang="en-US" dirty="0">
+                <a:latin typeface="Times New Roman" panose="02020603050405020304" pitchFamily="18" charset="0"/>
+                <a:cs typeface="Times New Roman" panose="02020603050405020304" pitchFamily="18" charset="0"/>
+              </a:rPr>
+              <a:t>23.06.2023</a:t>
+            </a:r>
+          </a:p>
+        </p:txBody>
+      </p:sp>
+      <p:sp>
+        <p:nvSpPr>
+          <p:cNvPr id="6" name="Slide Number Placeholder 5">
+            <a:extLst>
+              <a:ext uri="{FF2B5EF4-FFF2-40B4-BE49-F238E27FC236}">
+                <a16:creationId xmlns:a16="http://schemas.microsoft.com/office/drawing/2014/main" id="{5B8018CC-51B8-3728-784C-EB6D6BDC70AF}"/>
+              </a:ext>
+            </a:extLst>
+          </p:cNvPr>
+          <p:cNvSpPr>
+            <a:spLocks noGrp="1"/>
+          </p:cNvSpPr>
+          <p:nvPr>
+            <p:ph type="sldNum" sz="quarter" idx="12"/>
+          </p:nvPr>
+        </p:nvSpPr>
+        <p:spPr/>
+        <p:txBody>
+          <a:bodyPr/>
+          <a:lstStyle/>
+          <a:p>
+            <a:fld id="{73742D75-8AE6-4B9D-B26F-34D112FD718B}" type="slidenum">
+              <a:rPr lang="en-US" smtClean="0">
+                <a:latin typeface="Times New Roman" panose="02020603050405020304" pitchFamily="18" charset="0"/>
+                <a:cs typeface="Times New Roman" panose="02020603050405020304" pitchFamily="18" charset="0"/>
+              </a:rPr>
+              <a:t>2</a:t>
+            </a:fld>
+            <a:endParaRPr lang="en-US">
+              <a:latin typeface="Times New Roman" panose="02020603050405020304" pitchFamily="18" charset="0"/>
+              <a:cs typeface="Times New Roman" panose="02020603050405020304" pitchFamily="18" charset="0"/>
+            </a:endParaRPr>
+          </a:p>
+        </p:txBody>
+      </p:sp>
+      <p:sp>
+        <p:nvSpPr>
+          <p:cNvPr id="7" name="Footer Placeholder 5">
+            <a:extLst>
+              <a:ext uri="{FF2B5EF4-FFF2-40B4-BE49-F238E27FC236}">
+                <a16:creationId xmlns:a16="http://schemas.microsoft.com/office/drawing/2014/main" id="{94E60BFC-8E3D-2530-1B1E-561FD7A1754E}"/>
+              </a:ext>
+            </a:extLst>
+          </p:cNvPr>
+          <p:cNvSpPr>
+            <a:spLocks noGrp="1"/>
+          </p:cNvSpPr>
+          <p:nvPr>
+            <p:ph type="ftr" sz="quarter" idx="11"/>
+          </p:nvPr>
+        </p:nvSpPr>
+        <p:spPr>
+          <a:xfrm>
+            <a:off x="3686185" y="6459785"/>
+            <a:ext cx="4822804" cy="365125"/>
+          </a:xfrm>
+        </p:spPr>
+        <p:txBody>
+          <a:bodyPr/>
+          <a:lstStyle/>
+          <a:p>
+            <a:r>
+              <a:rPr lang="en-GB" dirty="0" err="1">
+                <a:latin typeface="Times New Roman" panose="02020603050405020304" pitchFamily="18" charset="0"/>
+                <a:cs typeface="Times New Roman" panose="02020603050405020304" pitchFamily="18" charset="0"/>
+              </a:rPr>
+              <a:t>ITk</a:t>
+            </a:r>
+            <a:r>
+              <a:rPr lang="en-GB" dirty="0">
+                <a:latin typeface="Times New Roman" panose="02020603050405020304" pitchFamily="18" charset="0"/>
+                <a:cs typeface="Times New Roman" panose="02020603050405020304" pitchFamily="18" charset="0"/>
+              </a:rPr>
+              <a:t> Strips ASICs Meeting</a:t>
             </a:r>
             <a:endParaRPr lang="en-US" dirty="0">
               <a:latin typeface="Times New Roman" panose="02020603050405020304" pitchFamily="18" charset="0"/>
@@ -5252,80 +4802,10 @@
           </a:p>
         </p:txBody>
       </p:sp>
-      <p:sp>
-        <p:nvSpPr>
-          <p:cNvPr id="5" name="Slide Number Placeholder 4">
-            <a:extLst>
-              <a:ext uri="{FF2B5EF4-FFF2-40B4-BE49-F238E27FC236}">
-                <a16:creationId xmlns:a16="http://schemas.microsoft.com/office/drawing/2014/main" id="{5BC2649C-BCB7-CD1F-48F8-0C1EDAE2FCDD}"/>
-              </a:ext>
-            </a:extLst>
-          </p:cNvPr>
-          <p:cNvSpPr>
-            <a:spLocks noGrp="1"/>
-          </p:cNvSpPr>
-          <p:nvPr>
-            <p:ph type="sldNum" sz="quarter" idx="12"/>
-          </p:nvPr>
-        </p:nvSpPr>
-        <p:spPr/>
-        <p:txBody>
-          <a:bodyPr/>
-          <a:lstStyle/>
-          <a:p>
-            <a:fld id="{73742D75-8AE6-4B9D-B26F-34D112FD718B}" type="slidenum">
-              <a:rPr lang="en-US" smtClean="0">
-                <a:latin typeface="Times New Roman" panose="02020603050405020304" pitchFamily="18" charset="0"/>
-                <a:cs typeface="Times New Roman" panose="02020603050405020304" pitchFamily="18" charset="0"/>
-              </a:rPr>
-              <a:t>2</a:t>
-            </a:fld>
-            <a:endParaRPr lang="en-US" dirty="0">
-              <a:latin typeface="Times New Roman" panose="02020603050405020304" pitchFamily="18" charset="0"/>
-              <a:cs typeface="Times New Roman" panose="02020603050405020304" pitchFamily="18" charset="0"/>
-            </a:endParaRPr>
-          </a:p>
-        </p:txBody>
-      </p:sp>
-      <p:sp>
-        <p:nvSpPr>
-          <p:cNvPr id="6" name="Footer Placeholder 5">
-            <a:extLst>
-              <a:ext uri="{FF2B5EF4-FFF2-40B4-BE49-F238E27FC236}">
-                <a16:creationId xmlns:a16="http://schemas.microsoft.com/office/drawing/2014/main" id="{B3C8591D-9896-1CB0-74B7-687EC2D05DE6}"/>
-              </a:ext>
-            </a:extLst>
-          </p:cNvPr>
-          <p:cNvSpPr>
-            <a:spLocks noGrp="1"/>
-          </p:cNvSpPr>
-          <p:nvPr>
-            <p:ph type="ftr" sz="quarter" idx="11"/>
-          </p:nvPr>
-        </p:nvSpPr>
-        <p:spPr/>
-        <p:txBody>
-          <a:bodyPr/>
-          <a:lstStyle/>
-          <a:p>
-            <a:r>
-              <a:rPr lang="en-GB">
-                <a:latin typeface="Times New Roman" panose="02020603050405020304" pitchFamily="18" charset="0"/>
-                <a:cs typeface="Times New Roman" panose="02020603050405020304" pitchFamily="18" charset="0"/>
-              </a:rPr>
-              <a:t>ITk Strips System Tests &amp; DAQ Meeting</a:t>
-            </a:r>
-            <a:endParaRPr lang="en-US" dirty="0">
-              <a:latin typeface="Times New Roman" panose="02020603050405020304" pitchFamily="18" charset="0"/>
-              <a:cs typeface="Times New Roman" panose="02020603050405020304" pitchFamily="18" charset="0"/>
-            </a:endParaRPr>
-          </a:p>
-        </p:txBody>
-      </p:sp>
     </p:spTree>
     <p:extLst>
       <p:ext uri="{BB962C8B-B14F-4D97-AF65-F5344CB8AC3E}">
-        <p14:creationId xmlns:p14="http://schemas.microsoft.com/office/powerpoint/2010/main" val="1814212036"/>
+        <p14:creationId xmlns:p14="http://schemas.microsoft.com/office/powerpoint/2010/main" val="4146741042"/>
       </p:ext>
     </p:extLst>
   </p:cSld>
@@ -5357,6 +4837,864 @@
           <p:cNvPr id="2" name="Title 1">
             <a:extLst>
               <a:ext uri="{FF2B5EF4-FFF2-40B4-BE49-F238E27FC236}">
+                <a16:creationId xmlns:a16="http://schemas.microsoft.com/office/drawing/2014/main" id="{8A4AAC7A-F091-1088-DCE1-AEEC91D8F333}"/>
+              </a:ext>
+            </a:extLst>
+          </p:cNvPr>
+          <p:cNvSpPr>
+            <a:spLocks noGrp="1"/>
+          </p:cNvSpPr>
+          <p:nvPr>
+            <p:ph type="title"/>
+          </p:nvPr>
+        </p:nvSpPr>
+        <p:spPr/>
+        <p:txBody>
+          <a:bodyPr/>
+          <a:lstStyle/>
+          <a:p>
+            <a:pPr algn="ctr"/>
+            <a:r>
+              <a:rPr lang="de-DE" dirty="0" err="1">
+                <a:latin typeface="Times New Roman" panose="02020603050405020304" pitchFamily="18" charset="0"/>
+                <a:cs typeface="Times New Roman" panose="02020603050405020304" pitchFamily="18" charset="0"/>
+              </a:rPr>
+              <a:t>Overview</a:t>
+            </a:r>
+            <a:endParaRPr lang="en-US" dirty="0">
+              <a:latin typeface="Times New Roman" panose="02020603050405020304" pitchFamily="18" charset="0"/>
+              <a:cs typeface="Times New Roman" panose="02020603050405020304" pitchFamily="18" charset="0"/>
+            </a:endParaRPr>
+          </a:p>
+        </p:txBody>
+      </p:sp>
+      <p:sp>
+        <p:nvSpPr>
+          <p:cNvPr id="3" name="Content Placeholder 2">
+            <a:extLst>
+              <a:ext uri="{FF2B5EF4-FFF2-40B4-BE49-F238E27FC236}">
+                <a16:creationId xmlns:a16="http://schemas.microsoft.com/office/drawing/2014/main" id="{88D4CFBC-F0F2-8A3D-3203-005734440AC3}"/>
+              </a:ext>
+            </a:extLst>
+          </p:cNvPr>
+          <p:cNvSpPr>
+            <a:spLocks noGrp="1"/>
+          </p:cNvSpPr>
+          <p:nvPr>
+            <p:ph idx="1"/>
+          </p:nvPr>
+        </p:nvSpPr>
+        <p:spPr/>
+        <p:txBody>
+          <a:bodyPr/>
+          <a:lstStyle/>
+          <a:p>
+            <a:pPr>
+              <a:buFont typeface="Arial" panose="020B0604020202020204" pitchFamily="34" charset="0"/>
+              <a:buChar char="•"/>
+            </a:pPr>
+            <a:endParaRPr lang="de-DE" dirty="0">
+              <a:latin typeface="Times New Roman" panose="02020603050405020304" pitchFamily="18" charset="0"/>
+              <a:cs typeface="Times New Roman" panose="02020603050405020304" pitchFamily="18" charset="0"/>
+            </a:endParaRPr>
+          </a:p>
+          <a:p>
+            <a:pPr>
+              <a:buFont typeface="Arial" panose="020B0604020202020204" pitchFamily="34" charset="0"/>
+              <a:buChar char="•"/>
+            </a:pPr>
+            <a:r>
+              <a:rPr lang="de-DE" dirty="0">
+                <a:latin typeface="Times New Roman" panose="02020603050405020304" pitchFamily="18" charset="0"/>
+                <a:cs typeface="Times New Roman" panose="02020603050405020304" pitchFamily="18" charset="0"/>
+              </a:rPr>
+              <a:t> </a:t>
+            </a:r>
+            <a:r>
+              <a:rPr lang="de-DE" dirty="0" err="1">
+                <a:latin typeface="Times New Roman" panose="02020603050405020304" pitchFamily="18" charset="0"/>
+                <a:cs typeface="Times New Roman" panose="02020603050405020304" pitchFamily="18" charset="0"/>
+              </a:rPr>
+              <a:t>Converts</a:t>
+            </a:r>
+            <a:r>
+              <a:rPr lang="de-DE" dirty="0">
+                <a:latin typeface="Times New Roman" panose="02020603050405020304" pitchFamily="18" charset="0"/>
+                <a:cs typeface="Times New Roman" panose="02020603050405020304" pitchFamily="18" charset="0"/>
+              </a:rPr>
+              <a:t> </a:t>
+            </a:r>
+            <a:r>
+              <a:rPr lang="de-DE" dirty="0" err="1">
+                <a:latin typeface="Times New Roman" panose="02020603050405020304" pitchFamily="18" charset="0"/>
+                <a:cs typeface="Times New Roman" panose="02020603050405020304" pitchFamily="18" charset="0"/>
+              </a:rPr>
+              <a:t>between</a:t>
+            </a:r>
+            <a:r>
+              <a:rPr lang="de-DE" dirty="0">
+                <a:latin typeface="Times New Roman" panose="02020603050405020304" pitchFamily="18" charset="0"/>
+                <a:cs typeface="Times New Roman" panose="02020603050405020304" pitchFamily="18" charset="0"/>
+              </a:rPr>
+              <a:t> </a:t>
+            </a:r>
+            <a:r>
+              <a:rPr lang="de-DE" dirty="0" err="1">
+                <a:latin typeface="Times New Roman" panose="02020603050405020304" pitchFamily="18" charset="0"/>
+                <a:cs typeface="Times New Roman" panose="02020603050405020304" pitchFamily="18" charset="0"/>
+              </a:rPr>
+              <a:t>output</a:t>
+            </a:r>
+            <a:r>
+              <a:rPr lang="de-DE" dirty="0">
+                <a:latin typeface="Times New Roman" panose="02020603050405020304" pitchFamily="18" charset="0"/>
+                <a:cs typeface="Times New Roman" panose="02020603050405020304" pitchFamily="18" charset="0"/>
+              </a:rPr>
+              <a:t> </a:t>
+            </a:r>
+            <a:r>
+              <a:rPr lang="de-DE" dirty="0" err="1">
+                <a:latin typeface="Times New Roman" panose="02020603050405020304" pitchFamily="18" charset="0"/>
+                <a:cs typeface="Times New Roman" panose="02020603050405020304" pitchFamily="18" charset="0"/>
+              </a:rPr>
+              <a:t>signal</a:t>
+            </a:r>
+            <a:r>
+              <a:rPr lang="de-DE" dirty="0">
+                <a:latin typeface="Times New Roman" panose="02020603050405020304" pitchFamily="18" charset="0"/>
+                <a:cs typeface="Times New Roman" panose="02020603050405020304" pitchFamily="18" charset="0"/>
+              </a:rPr>
+              <a:t> (</a:t>
+            </a:r>
+            <a:r>
+              <a:rPr lang="de-DE" dirty="0" err="1">
+                <a:latin typeface="Times New Roman" panose="02020603050405020304" pitchFamily="18" charset="0"/>
+                <a:cs typeface="Times New Roman" panose="02020603050405020304" pitchFamily="18" charset="0"/>
+              </a:rPr>
+              <a:t>register</a:t>
+            </a:r>
+            <a:r>
+              <a:rPr lang="de-DE" dirty="0">
+                <a:latin typeface="Times New Roman" panose="02020603050405020304" pitchFamily="18" charset="0"/>
+                <a:cs typeface="Times New Roman" panose="02020603050405020304" pitchFamily="18" charset="0"/>
+              </a:rPr>
+              <a:t> </a:t>
+            </a:r>
+            <a:r>
+              <a:rPr lang="de-DE" dirty="0" err="1">
+                <a:latin typeface="Times New Roman" panose="02020603050405020304" pitchFamily="18" charset="0"/>
+                <a:cs typeface="Times New Roman" panose="02020603050405020304" pitchFamily="18" charset="0"/>
+              </a:rPr>
+              <a:t>content</a:t>
+            </a:r>
+            <a:r>
+              <a:rPr lang="de-DE" dirty="0">
+                <a:latin typeface="Times New Roman" panose="02020603050405020304" pitchFamily="18" charset="0"/>
+                <a:cs typeface="Times New Roman" panose="02020603050405020304" pitchFamily="18" charset="0"/>
+              </a:rPr>
+              <a:t>) and </a:t>
+            </a:r>
+            <a:r>
+              <a:rPr lang="de-DE" dirty="0" err="1">
+                <a:latin typeface="Times New Roman" panose="02020603050405020304" pitchFamily="18" charset="0"/>
+                <a:cs typeface="Times New Roman" panose="02020603050405020304" pitchFamily="18" charset="0"/>
+              </a:rPr>
+              <a:t>readout</a:t>
+            </a:r>
+            <a:r>
+              <a:rPr lang="de-DE" dirty="0">
+                <a:latin typeface="Times New Roman" panose="02020603050405020304" pitchFamily="18" charset="0"/>
+                <a:cs typeface="Times New Roman" panose="02020603050405020304" pitchFamily="18" charset="0"/>
+              </a:rPr>
+              <a:t> </a:t>
+            </a:r>
+            <a:r>
+              <a:rPr lang="de-DE" dirty="0" err="1">
+                <a:latin typeface="Times New Roman" panose="02020603050405020304" pitchFamily="18" charset="0"/>
+                <a:cs typeface="Times New Roman" panose="02020603050405020304" pitchFamily="18" charset="0"/>
+              </a:rPr>
+              <a:t>information</a:t>
+            </a:r>
+            <a:r>
+              <a:rPr lang="de-DE" dirty="0">
+                <a:latin typeface="Times New Roman" panose="02020603050405020304" pitchFamily="18" charset="0"/>
+                <a:cs typeface="Times New Roman" panose="02020603050405020304" pitchFamily="18" charset="0"/>
+              </a:rPr>
+              <a:t> </a:t>
+            </a:r>
+            <a:r>
+              <a:rPr lang="de-DE" dirty="0" err="1">
+                <a:latin typeface="Times New Roman" panose="02020603050405020304" pitchFamily="18" charset="0"/>
+                <a:cs typeface="Times New Roman" panose="02020603050405020304" pitchFamily="18" charset="0"/>
+              </a:rPr>
+              <a:t>for</a:t>
+            </a:r>
+            <a:r>
+              <a:rPr lang="de-DE" dirty="0">
+                <a:latin typeface="Times New Roman" panose="02020603050405020304" pitchFamily="18" charset="0"/>
+                <a:cs typeface="Times New Roman" panose="02020603050405020304" pitchFamily="18" charset="0"/>
+              </a:rPr>
+              <a:t> </a:t>
+            </a:r>
+            <a:r>
+              <a:rPr lang="de-DE" dirty="0" err="1">
+                <a:latin typeface="Times New Roman" panose="02020603050405020304" pitchFamily="18" charset="0"/>
+                <a:cs typeface="Times New Roman" panose="02020603050405020304" pitchFamily="18" charset="0"/>
+              </a:rPr>
+              <a:t>each</a:t>
+            </a:r>
+            <a:r>
+              <a:rPr lang="de-DE" dirty="0">
+                <a:latin typeface="Times New Roman" panose="02020603050405020304" pitchFamily="18" charset="0"/>
+                <a:cs typeface="Times New Roman" panose="02020603050405020304" pitchFamily="18" charset="0"/>
+              </a:rPr>
+              <a:t> </a:t>
+            </a:r>
+            <a:r>
+              <a:rPr lang="de-DE" dirty="0" err="1">
+                <a:latin typeface="Times New Roman" panose="02020603050405020304" pitchFamily="18" charset="0"/>
+                <a:cs typeface="Times New Roman" panose="02020603050405020304" pitchFamily="18" charset="0"/>
+              </a:rPr>
+              <a:t>register</a:t>
+            </a:r>
+            <a:endParaRPr lang="de-DE" dirty="0">
+              <a:latin typeface="Times New Roman" panose="02020603050405020304" pitchFamily="18" charset="0"/>
+              <a:cs typeface="Times New Roman" panose="02020603050405020304" pitchFamily="18" charset="0"/>
+            </a:endParaRPr>
+          </a:p>
+          <a:p>
+            <a:pPr>
+              <a:buFont typeface="Arial" panose="020B0604020202020204" pitchFamily="34" charset="0"/>
+              <a:buChar char="•"/>
+            </a:pPr>
+            <a:r>
+              <a:rPr lang="de-DE" dirty="0">
+                <a:latin typeface="Times New Roman" panose="02020603050405020304" pitchFamily="18" charset="0"/>
+                <a:cs typeface="Times New Roman" panose="02020603050405020304" pitchFamily="18" charset="0"/>
+              </a:rPr>
+              <a:t> Can </a:t>
+            </a:r>
+            <a:r>
+              <a:rPr lang="de-DE" dirty="0" err="1">
+                <a:latin typeface="Times New Roman" panose="02020603050405020304" pitchFamily="18" charset="0"/>
+                <a:cs typeface="Times New Roman" panose="02020603050405020304" pitchFamily="18" charset="0"/>
+              </a:rPr>
+              <a:t>input</a:t>
+            </a:r>
+            <a:r>
+              <a:rPr lang="de-DE" dirty="0">
+                <a:latin typeface="Times New Roman" panose="02020603050405020304" pitchFamily="18" charset="0"/>
+                <a:cs typeface="Times New Roman" panose="02020603050405020304" pitchFamily="18" charset="0"/>
+              </a:rPr>
+              <a:t> </a:t>
+            </a:r>
+            <a:r>
+              <a:rPr lang="de-DE" dirty="0" err="1">
+                <a:latin typeface="Times New Roman" panose="02020603050405020304" pitchFamily="18" charset="0"/>
+                <a:cs typeface="Times New Roman" panose="02020603050405020304" pitchFamily="18" charset="0"/>
+              </a:rPr>
+              <a:t>binary</a:t>
+            </a:r>
+            <a:r>
+              <a:rPr lang="de-DE" dirty="0">
+                <a:latin typeface="Times New Roman" panose="02020603050405020304" pitchFamily="18" charset="0"/>
+                <a:cs typeface="Times New Roman" panose="02020603050405020304" pitchFamily="18" charset="0"/>
+              </a:rPr>
+              <a:t>, </a:t>
+            </a:r>
+            <a:r>
+              <a:rPr lang="de-DE" dirty="0" err="1">
+                <a:latin typeface="Times New Roman" panose="02020603050405020304" pitchFamily="18" charset="0"/>
+                <a:cs typeface="Times New Roman" panose="02020603050405020304" pitchFamily="18" charset="0"/>
+              </a:rPr>
+              <a:t>hexadecimal</a:t>
+            </a:r>
+            <a:r>
+              <a:rPr lang="de-DE" dirty="0">
+                <a:latin typeface="Times New Roman" panose="02020603050405020304" pitchFamily="18" charset="0"/>
+                <a:cs typeface="Times New Roman" panose="02020603050405020304" pitchFamily="18" charset="0"/>
+              </a:rPr>
+              <a:t>, </a:t>
+            </a:r>
+            <a:r>
+              <a:rPr lang="de-DE" dirty="0" err="1">
+                <a:latin typeface="Times New Roman" panose="02020603050405020304" pitchFamily="18" charset="0"/>
+                <a:cs typeface="Times New Roman" panose="02020603050405020304" pitchFamily="18" charset="0"/>
+              </a:rPr>
+              <a:t>or</a:t>
+            </a:r>
+            <a:r>
+              <a:rPr lang="de-DE" dirty="0">
+                <a:latin typeface="Times New Roman" panose="02020603050405020304" pitchFamily="18" charset="0"/>
+                <a:cs typeface="Times New Roman" panose="02020603050405020304" pitchFamily="18" charset="0"/>
+              </a:rPr>
+              <a:t> </a:t>
+            </a:r>
+            <a:r>
+              <a:rPr lang="de-DE" dirty="0" err="1">
+                <a:latin typeface="Times New Roman" panose="02020603050405020304" pitchFamily="18" charset="0"/>
+                <a:cs typeface="Times New Roman" panose="02020603050405020304" pitchFamily="18" charset="0"/>
+              </a:rPr>
+              <a:t>decimal</a:t>
+            </a:r>
+            <a:r>
+              <a:rPr lang="de-DE" dirty="0">
+                <a:latin typeface="Times New Roman" panose="02020603050405020304" pitchFamily="18" charset="0"/>
+                <a:cs typeface="Times New Roman" panose="02020603050405020304" pitchFamily="18" charset="0"/>
+              </a:rPr>
+              <a:t> </a:t>
+            </a:r>
+            <a:r>
+              <a:rPr lang="de-DE" dirty="0" err="1">
+                <a:latin typeface="Times New Roman" panose="02020603050405020304" pitchFamily="18" charset="0"/>
+                <a:cs typeface="Times New Roman" panose="02020603050405020304" pitchFamily="18" charset="0"/>
+              </a:rPr>
+              <a:t>signal</a:t>
+            </a:r>
+            <a:endParaRPr lang="de-DE" dirty="0">
+              <a:latin typeface="Times New Roman" panose="02020603050405020304" pitchFamily="18" charset="0"/>
+              <a:cs typeface="Times New Roman" panose="02020603050405020304" pitchFamily="18" charset="0"/>
+            </a:endParaRPr>
+          </a:p>
+          <a:p>
+            <a:pPr>
+              <a:buFont typeface="Arial" panose="020B0604020202020204" pitchFamily="34" charset="0"/>
+              <a:buChar char="•"/>
+            </a:pPr>
+            <a:r>
+              <a:rPr lang="de-DE" dirty="0">
+                <a:latin typeface="Times New Roman" panose="02020603050405020304" pitchFamily="18" charset="0"/>
+                <a:cs typeface="Times New Roman" panose="02020603050405020304" pitchFamily="18" charset="0"/>
+              </a:rPr>
+              <a:t> Update: </a:t>
+            </a:r>
+            <a:r>
+              <a:rPr lang="de-DE" dirty="0" err="1">
+                <a:latin typeface="Times New Roman" panose="02020603050405020304" pitchFamily="18" charset="0"/>
+                <a:cs typeface="Times New Roman" panose="02020603050405020304" pitchFamily="18" charset="0"/>
+              </a:rPr>
+              <a:t>can</a:t>
+            </a:r>
+            <a:r>
+              <a:rPr lang="de-DE" dirty="0">
+                <a:latin typeface="Times New Roman" panose="02020603050405020304" pitchFamily="18" charset="0"/>
+                <a:cs typeface="Times New Roman" panose="02020603050405020304" pitchFamily="18" charset="0"/>
+              </a:rPr>
+              <a:t> </a:t>
+            </a:r>
+            <a:r>
+              <a:rPr lang="de-DE" dirty="0" err="1">
+                <a:latin typeface="Times New Roman" panose="02020603050405020304" pitchFamily="18" charset="0"/>
+                <a:cs typeface="Times New Roman" panose="02020603050405020304" pitchFamily="18" charset="0"/>
+              </a:rPr>
+              <a:t>now</a:t>
+            </a:r>
+            <a:r>
+              <a:rPr lang="de-DE" dirty="0">
+                <a:latin typeface="Times New Roman" panose="02020603050405020304" pitchFamily="18" charset="0"/>
+                <a:cs typeface="Times New Roman" panose="02020603050405020304" pitchFamily="18" charset="0"/>
+              </a:rPr>
+              <a:t> </a:t>
+            </a:r>
+            <a:r>
+              <a:rPr lang="de-DE" dirty="0" err="1">
+                <a:latin typeface="Times New Roman" panose="02020603050405020304" pitchFamily="18" charset="0"/>
+                <a:cs typeface="Times New Roman" panose="02020603050405020304" pitchFamily="18" charset="0"/>
+              </a:rPr>
+              <a:t>select</a:t>
+            </a:r>
+            <a:r>
+              <a:rPr lang="de-DE" dirty="0">
+                <a:latin typeface="Times New Roman" panose="02020603050405020304" pitchFamily="18" charset="0"/>
+                <a:cs typeface="Times New Roman" panose="02020603050405020304" pitchFamily="18" charset="0"/>
+              </a:rPr>
+              <a:t> </a:t>
+            </a:r>
+            <a:r>
+              <a:rPr lang="de-DE" dirty="0" err="1">
+                <a:latin typeface="Times New Roman" panose="02020603050405020304" pitchFamily="18" charset="0"/>
+                <a:cs typeface="Times New Roman" panose="02020603050405020304" pitchFamily="18" charset="0"/>
+              </a:rPr>
+              <a:t>registers</a:t>
+            </a:r>
+            <a:r>
+              <a:rPr lang="de-DE" dirty="0">
+                <a:latin typeface="Times New Roman" panose="02020603050405020304" pitchFamily="18" charset="0"/>
+                <a:cs typeface="Times New Roman" panose="02020603050405020304" pitchFamily="18" charset="0"/>
+              </a:rPr>
+              <a:t> </a:t>
+            </a:r>
+            <a:r>
+              <a:rPr lang="de-DE" dirty="0" err="1">
+                <a:latin typeface="Times New Roman" panose="02020603050405020304" pitchFamily="18" charset="0"/>
+                <a:cs typeface="Times New Roman" panose="02020603050405020304" pitchFamily="18" charset="0"/>
+              </a:rPr>
+              <a:t>by</a:t>
+            </a:r>
+            <a:r>
+              <a:rPr lang="de-DE" dirty="0">
+                <a:latin typeface="Times New Roman" panose="02020603050405020304" pitchFamily="18" charset="0"/>
+                <a:cs typeface="Times New Roman" panose="02020603050405020304" pitchFamily="18" charset="0"/>
+              </a:rPr>
+              <a:t> </a:t>
+            </a:r>
+            <a:r>
+              <a:rPr lang="de-DE" dirty="0" err="1">
+                <a:latin typeface="Times New Roman" panose="02020603050405020304" pitchFamily="18" charset="0"/>
+                <a:cs typeface="Times New Roman" panose="02020603050405020304" pitchFamily="18" charset="0"/>
+              </a:rPr>
+              <a:t>name</a:t>
+            </a:r>
+            <a:r>
+              <a:rPr lang="de-DE" dirty="0">
+                <a:latin typeface="Times New Roman" panose="02020603050405020304" pitchFamily="18" charset="0"/>
+                <a:cs typeface="Times New Roman" panose="02020603050405020304" pitchFamily="18" charset="0"/>
+              </a:rPr>
+              <a:t>, and </a:t>
+            </a:r>
+            <a:r>
+              <a:rPr lang="de-DE" dirty="0" err="1">
+                <a:latin typeface="Times New Roman" panose="02020603050405020304" pitchFamily="18" charset="0"/>
+                <a:cs typeface="Times New Roman" panose="02020603050405020304" pitchFamily="18" charset="0"/>
+              </a:rPr>
+              <a:t>hexadecimal</a:t>
+            </a:r>
+            <a:r>
+              <a:rPr lang="de-DE" dirty="0">
+                <a:latin typeface="Times New Roman" panose="02020603050405020304" pitchFamily="18" charset="0"/>
+                <a:cs typeface="Times New Roman" panose="02020603050405020304" pitchFamily="18" charset="0"/>
+              </a:rPr>
+              <a:t> </a:t>
+            </a:r>
+            <a:r>
+              <a:rPr lang="de-DE" dirty="0" err="1">
+                <a:latin typeface="Times New Roman" panose="02020603050405020304" pitchFamily="18" charset="0"/>
+                <a:cs typeface="Times New Roman" panose="02020603050405020304" pitchFamily="18" charset="0"/>
+              </a:rPr>
+              <a:t>number</a:t>
+            </a:r>
+            <a:r>
+              <a:rPr lang="de-DE" dirty="0">
+                <a:latin typeface="Times New Roman" panose="02020603050405020304" pitchFamily="18" charset="0"/>
+                <a:cs typeface="Times New Roman" panose="02020603050405020304" pitchFamily="18" charset="0"/>
+              </a:rPr>
+              <a:t> in </a:t>
+            </a:r>
+            <a:r>
+              <a:rPr lang="de-DE" dirty="0" err="1">
+                <a:latin typeface="Times New Roman" panose="02020603050405020304" pitchFamily="18" charset="0"/>
+                <a:cs typeface="Times New Roman" panose="02020603050405020304" pitchFamily="18" charset="0"/>
+              </a:rPr>
+              <a:t>addition</a:t>
+            </a:r>
+            <a:r>
+              <a:rPr lang="de-DE" dirty="0">
+                <a:latin typeface="Times New Roman" panose="02020603050405020304" pitchFamily="18" charset="0"/>
+                <a:cs typeface="Times New Roman" panose="02020603050405020304" pitchFamily="18" charset="0"/>
+              </a:rPr>
+              <a:t> </a:t>
+            </a:r>
+            <a:r>
+              <a:rPr lang="de-DE" dirty="0" err="1">
+                <a:latin typeface="Times New Roman" panose="02020603050405020304" pitchFamily="18" charset="0"/>
+                <a:cs typeface="Times New Roman" panose="02020603050405020304" pitchFamily="18" charset="0"/>
+              </a:rPr>
+              <a:t>to</a:t>
+            </a:r>
+            <a:r>
+              <a:rPr lang="de-DE" dirty="0">
+                <a:latin typeface="Times New Roman" panose="02020603050405020304" pitchFamily="18" charset="0"/>
+                <a:cs typeface="Times New Roman" panose="02020603050405020304" pitchFamily="18" charset="0"/>
+              </a:rPr>
+              <a:t> </a:t>
+            </a:r>
+            <a:r>
+              <a:rPr lang="de-DE" dirty="0" err="1">
+                <a:latin typeface="Times New Roman" panose="02020603050405020304" pitchFamily="18" charset="0"/>
+                <a:cs typeface="Times New Roman" panose="02020603050405020304" pitchFamily="18" charset="0"/>
+              </a:rPr>
+              <a:t>decimal</a:t>
+            </a:r>
+            <a:r>
+              <a:rPr lang="de-DE" dirty="0">
+                <a:latin typeface="Times New Roman" panose="02020603050405020304" pitchFamily="18" charset="0"/>
+                <a:cs typeface="Times New Roman" panose="02020603050405020304" pitchFamily="18" charset="0"/>
+              </a:rPr>
+              <a:t> </a:t>
+            </a:r>
+            <a:r>
+              <a:rPr lang="de-DE" dirty="0" err="1">
+                <a:latin typeface="Times New Roman" panose="02020603050405020304" pitchFamily="18" charset="0"/>
+                <a:cs typeface="Times New Roman" panose="02020603050405020304" pitchFamily="18" charset="0"/>
+              </a:rPr>
+              <a:t>number</a:t>
+            </a:r>
+            <a:endParaRPr lang="de-DE" dirty="0">
+              <a:latin typeface="Times New Roman" panose="02020603050405020304" pitchFamily="18" charset="0"/>
+              <a:cs typeface="Times New Roman" panose="02020603050405020304" pitchFamily="18" charset="0"/>
+            </a:endParaRPr>
+          </a:p>
+          <a:p>
+            <a:pPr>
+              <a:buFont typeface="Arial" panose="020B0604020202020204" pitchFamily="34" charset="0"/>
+              <a:buChar char="•"/>
+            </a:pPr>
+            <a:r>
+              <a:rPr lang="de-DE" dirty="0">
+                <a:latin typeface="Times New Roman" panose="02020603050405020304" pitchFamily="18" charset="0"/>
+                <a:cs typeface="Times New Roman" panose="02020603050405020304" pitchFamily="18" charset="0"/>
+              </a:rPr>
+              <a:t> Update </a:t>
+            </a:r>
+            <a:r>
+              <a:rPr lang="de-DE" dirty="0" err="1">
+                <a:latin typeface="Times New Roman" panose="02020603050405020304" pitchFamily="18" charset="0"/>
+                <a:cs typeface="Times New Roman" panose="02020603050405020304" pitchFamily="18" charset="0"/>
+              </a:rPr>
+              <a:t>to</a:t>
+            </a:r>
+            <a:r>
+              <a:rPr lang="de-DE" dirty="0">
+                <a:latin typeface="Times New Roman" panose="02020603050405020304" pitchFamily="18" charset="0"/>
+                <a:cs typeface="Times New Roman" panose="02020603050405020304" pitchFamily="18" charset="0"/>
+              </a:rPr>
+              <a:t> </a:t>
+            </a:r>
+            <a:r>
+              <a:rPr lang="de-DE" dirty="0" err="1">
+                <a:latin typeface="Times New Roman" panose="02020603050405020304" pitchFamily="18" charset="0"/>
+                <a:cs typeface="Times New Roman" panose="02020603050405020304" pitchFamily="18" charset="0"/>
+              </a:rPr>
+              <a:t>new</a:t>
+            </a:r>
+            <a:r>
+              <a:rPr lang="de-DE" dirty="0">
+                <a:latin typeface="Times New Roman" panose="02020603050405020304" pitchFamily="18" charset="0"/>
+                <a:cs typeface="Times New Roman" panose="02020603050405020304" pitchFamily="18" charset="0"/>
+              </a:rPr>
+              <a:t> </a:t>
+            </a:r>
+            <a:r>
+              <a:rPr lang="de-DE" dirty="0" err="1">
+                <a:latin typeface="Times New Roman" panose="02020603050405020304" pitchFamily="18" charset="0"/>
+                <a:cs typeface="Times New Roman" panose="02020603050405020304" pitchFamily="18" charset="0"/>
+              </a:rPr>
+              <a:t>register</a:t>
+            </a:r>
+            <a:r>
+              <a:rPr lang="de-DE" dirty="0">
+                <a:latin typeface="Times New Roman" panose="02020603050405020304" pitchFamily="18" charset="0"/>
+                <a:cs typeface="Times New Roman" panose="02020603050405020304" pitchFamily="18" charset="0"/>
+              </a:rPr>
+              <a:t> </a:t>
+            </a:r>
+            <a:r>
+              <a:rPr lang="de-DE" dirty="0" err="1">
+                <a:latin typeface="Times New Roman" panose="02020603050405020304" pitchFamily="18" charset="0"/>
+                <a:cs typeface="Times New Roman" panose="02020603050405020304" pitchFamily="18" charset="0"/>
+              </a:rPr>
+              <a:t>maps</a:t>
+            </a:r>
+            <a:r>
+              <a:rPr lang="de-DE" dirty="0">
+                <a:latin typeface="Times New Roman" panose="02020603050405020304" pitchFamily="18" charset="0"/>
+                <a:cs typeface="Times New Roman" panose="02020603050405020304" pitchFamily="18" charset="0"/>
+              </a:rPr>
+              <a:t> </a:t>
+            </a:r>
+            <a:r>
+              <a:rPr lang="de-DE" dirty="0" err="1">
+                <a:latin typeface="Times New Roman" panose="02020603050405020304" pitchFamily="18" charset="0"/>
+                <a:cs typeface="Times New Roman" panose="02020603050405020304" pitchFamily="18" charset="0"/>
+              </a:rPr>
+              <a:t>for</a:t>
+            </a:r>
+            <a:r>
+              <a:rPr lang="de-DE" dirty="0">
+                <a:latin typeface="Times New Roman" panose="02020603050405020304" pitchFamily="18" charset="0"/>
+                <a:cs typeface="Times New Roman" panose="02020603050405020304" pitchFamily="18" charset="0"/>
+              </a:rPr>
+              <a:t> </a:t>
+            </a:r>
+            <a:r>
+              <a:rPr lang="de-DE" dirty="0" err="1">
+                <a:latin typeface="Times New Roman" panose="02020603050405020304" pitchFamily="18" charset="0"/>
+                <a:cs typeface="Times New Roman" panose="02020603050405020304" pitchFamily="18" charset="0"/>
+              </a:rPr>
+              <a:t>ABCStar</a:t>
+            </a:r>
+            <a:r>
+              <a:rPr lang="de-DE" dirty="0">
+                <a:latin typeface="Times New Roman" panose="02020603050405020304" pitchFamily="18" charset="0"/>
+                <a:cs typeface="Times New Roman" panose="02020603050405020304" pitchFamily="18" charset="0"/>
+              </a:rPr>
+              <a:t> v1, </a:t>
+            </a:r>
+            <a:r>
+              <a:rPr lang="de-DE" dirty="0" err="1">
+                <a:latin typeface="Times New Roman" panose="02020603050405020304" pitchFamily="18" charset="0"/>
+                <a:cs typeface="Times New Roman" panose="02020603050405020304" pitchFamily="18" charset="0"/>
+              </a:rPr>
+              <a:t>HCCStar</a:t>
+            </a:r>
+            <a:r>
+              <a:rPr lang="de-DE" dirty="0">
+                <a:latin typeface="Times New Roman" panose="02020603050405020304" pitchFamily="18" charset="0"/>
+                <a:cs typeface="Times New Roman" panose="02020603050405020304" pitchFamily="18" charset="0"/>
+              </a:rPr>
+              <a:t> v1, and </a:t>
+            </a:r>
+            <a:r>
+              <a:rPr lang="de-DE" dirty="0" err="1">
+                <a:latin typeface="Times New Roman" panose="02020603050405020304" pitchFamily="18" charset="0"/>
+                <a:cs typeface="Times New Roman" panose="02020603050405020304" pitchFamily="18" charset="0"/>
+              </a:rPr>
+              <a:t>AMACStar</a:t>
+            </a:r>
+            <a:endParaRPr lang="de-DE" dirty="0">
+              <a:latin typeface="Times New Roman" panose="02020603050405020304" pitchFamily="18" charset="0"/>
+              <a:cs typeface="Times New Roman" panose="02020603050405020304" pitchFamily="18" charset="0"/>
+            </a:endParaRPr>
+          </a:p>
+          <a:p>
+            <a:pPr>
+              <a:buFont typeface="Arial" panose="020B0604020202020204" pitchFamily="34" charset="0"/>
+              <a:buChar char="•"/>
+            </a:pPr>
+            <a:r>
+              <a:rPr lang="de-DE" dirty="0">
+                <a:latin typeface="Times New Roman" panose="02020603050405020304" pitchFamily="18" charset="0"/>
+                <a:cs typeface="Times New Roman" panose="02020603050405020304" pitchFamily="18" charset="0"/>
+              </a:rPr>
+              <a:t> Old </a:t>
+            </a:r>
+            <a:r>
+              <a:rPr lang="de-DE" dirty="0" err="1">
+                <a:latin typeface="Times New Roman" panose="02020603050405020304" pitchFamily="18" charset="0"/>
+                <a:cs typeface="Times New Roman" panose="02020603050405020304" pitchFamily="18" charset="0"/>
+              </a:rPr>
+              <a:t>version</a:t>
+            </a:r>
+            <a:r>
+              <a:rPr lang="de-DE" dirty="0">
+                <a:latin typeface="Times New Roman" panose="02020603050405020304" pitchFamily="18" charset="0"/>
+                <a:cs typeface="Times New Roman" panose="02020603050405020304" pitchFamily="18" charset="0"/>
+              </a:rPr>
+              <a:t>: </a:t>
+            </a:r>
+            <a:r>
+              <a:rPr lang="de-DE" dirty="0">
+                <a:latin typeface="Times New Roman" panose="02020603050405020304" pitchFamily="18" charset="0"/>
+                <a:cs typeface="Times New Roman" panose="02020603050405020304" pitchFamily="18" charset="0"/>
+                <a:hlinkClick r:id="rId2"/>
+              </a:rPr>
+              <a:t>http://www.hep.upenn.edu/ATLAS_upgrade/ITk/ASICs/Registers.html</a:t>
+            </a:r>
+            <a:endParaRPr lang="de-DE" dirty="0">
+              <a:latin typeface="Times New Roman" panose="02020603050405020304" pitchFamily="18" charset="0"/>
+              <a:cs typeface="Times New Roman" panose="02020603050405020304" pitchFamily="18" charset="0"/>
+            </a:endParaRPr>
+          </a:p>
+          <a:p>
+            <a:pPr>
+              <a:buFont typeface="Arial" panose="020B0604020202020204" pitchFamily="34" charset="0"/>
+              <a:buChar char="•"/>
+            </a:pPr>
+            <a:r>
+              <a:rPr lang="de-DE" dirty="0">
+                <a:latin typeface="Times New Roman" panose="02020603050405020304" pitchFamily="18" charset="0"/>
+                <a:cs typeface="Times New Roman" panose="02020603050405020304" pitchFamily="18" charset="0"/>
+              </a:rPr>
+              <a:t> New </a:t>
+            </a:r>
+            <a:r>
+              <a:rPr lang="de-DE" dirty="0" err="1">
+                <a:latin typeface="Times New Roman" panose="02020603050405020304" pitchFamily="18" charset="0"/>
+                <a:cs typeface="Times New Roman" panose="02020603050405020304" pitchFamily="18" charset="0"/>
+              </a:rPr>
+              <a:t>version</a:t>
+            </a:r>
+            <a:r>
+              <a:rPr lang="de-DE" dirty="0">
+                <a:latin typeface="Times New Roman" panose="02020603050405020304" pitchFamily="18" charset="0"/>
+                <a:cs typeface="Times New Roman" panose="02020603050405020304" pitchFamily="18" charset="0"/>
+              </a:rPr>
+              <a:t>: </a:t>
+            </a:r>
+            <a:r>
+              <a:rPr lang="en-GB" dirty="0">
+                <a:latin typeface="Times New Roman" panose="02020603050405020304" pitchFamily="18" charset="0"/>
+                <a:cs typeface="Times New Roman" panose="02020603050405020304" pitchFamily="18" charset="0"/>
+                <a:hlinkClick r:id="rId3"/>
+              </a:rPr>
+              <a:t>https://github.com/gretagoldberg/Register_Converter.git</a:t>
+            </a:r>
+            <a:endParaRPr lang="en-GB" dirty="0">
+              <a:latin typeface="Times New Roman" panose="02020603050405020304" pitchFamily="18" charset="0"/>
+              <a:cs typeface="Times New Roman" panose="02020603050405020304" pitchFamily="18" charset="0"/>
+            </a:endParaRPr>
+          </a:p>
+          <a:p>
+            <a:pPr marL="0" indent="0">
+              <a:buNone/>
+            </a:pPr>
+            <a:endParaRPr lang="de-DE" dirty="0">
+              <a:latin typeface="Times New Roman" panose="02020603050405020304" pitchFamily="18" charset="0"/>
+              <a:cs typeface="Times New Roman" panose="02020603050405020304" pitchFamily="18" charset="0"/>
+            </a:endParaRPr>
+          </a:p>
+          <a:p>
+            <a:pPr>
+              <a:buFont typeface="Arial" panose="020B0604020202020204" pitchFamily="34" charset="0"/>
+              <a:buChar char="•"/>
+            </a:pPr>
+            <a:endParaRPr lang="en-US" dirty="0">
+              <a:latin typeface="Times New Roman" panose="02020603050405020304" pitchFamily="18" charset="0"/>
+              <a:cs typeface="Times New Roman" panose="02020603050405020304" pitchFamily="18" charset="0"/>
+            </a:endParaRPr>
+          </a:p>
+        </p:txBody>
+      </p:sp>
+      <p:sp>
+        <p:nvSpPr>
+          <p:cNvPr id="4" name="Date Placeholder 3">
+            <a:extLst>
+              <a:ext uri="{FF2B5EF4-FFF2-40B4-BE49-F238E27FC236}">
+                <a16:creationId xmlns:a16="http://schemas.microsoft.com/office/drawing/2014/main" id="{FD60694C-C5EA-2B37-2CE9-900A7CB6FBF7}"/>
+              </a:ext>
+            </a:extLst>
+          </p:cNvPr>
+          <p:cNvSpPr>
+            <a:spLocks noGrp="1"/>
+          </p:cNvSpPr>
+          <p:nvPr>
+            <p:ph type="dt" sz="half" idx="10"/>
+          </p:nvPr>
+        </p:nvSpPr>
+        <p:spPr/>
+        <p:txBody>
+          <a:bodyPr/>
+          <a:lstStyle/>
+          <a:p>
+            <a:r>
+              <a:rPr lang="en-US">
+                <a:latin typeface="Times New Roman" panose="02020603050405020304" pitchFamily="18" charset="0"/>
+                <a:cs typeface="Times New Roman" panose="02020603050405020304" pitchFamily="18" charset="0"/>
+              </a:rPr>
+              <a:t>22.06.2023</a:t>
+            </a:r>
+            <a:endParaRPr lang="en-US" dirty="0">
+              <a:latin typeface="Times New Roman" panose="02020603050405020304" pitchFamily="18" charset="0"/>
+              <a:cs typeface="Times New Roman" panose="02020603050405020304" pitchFamily="18" charset="0"/>
+            </a:endParaRPr>
+          </a:p>
+        </p:txBody>
+      </p:sp>
+      <p:sp>
+        <p:nvSpPr>
+          <p:cNvPr id="5" name="Slide Number Placeholder 4">
+            <a:extLst>
+              <a:ext uri="{FF2B5EF4-FFF2-40B4-BE49-F238E27FC236}">
+                <a16:creationId xmlns:a16="http://schemas.microsoft.com/office/drawing/2014/main" id="{5BC2649C-BCB7-CD1F-48F8-0C1EDAE2FCDD}"/>
+              </a:ext>
+            </a:extLst>
+          </p:cNvPr>
+          <p:cNvSpPr>
+            <a:spLocks noGrp="1"/>
+          </p:cNvSpPr>
+          <p:nvPr>
+            <p:ph type="sldNum" sz="quarter" idx="12"/>
+          </p:nvPr>
+        </p:nvSpPr>
+        <p:spPr/>
+        <p:txBody>
+          <a:bodyPr/>
+          <a:lstStyle/>
+          <a:p>
+            <a:fld id="{73742D75-8AE6-4B9D-B26F-34D112FD718B}" type="slidenum">
+              <a:rPr lang="en-US" smtClean="0">
+                <a:latin typeface="Times New Roman" panose="02020603050405020304" pitchFamily="18" charset="0"/>
+                <a:cs typeface="Times New Roman" panose="02020603050405020304" pitchFamily="18" charset="0"/>
+              </a:rPr>
+              <a:t>3</a:t>
+            </a:fld>
+            <a:endParaRPr lang="en-US" dirty="0">
+              <a:latin typeface="Times New Roman" panose="02020603050405020304" pitchFamily="18" charset="0"/>
+              <a:cs typeface="Times New Roman" panose="02020603050405020304" pitchFamily="18" charset="0"/>
+            </a:endParaRPr>
+          </a:p>
+        </p:txBody>
+      </p:sp>
+      <p:sp>
+        <p:nvSpPr>
+          <p:cNvPr id="6" name="Footer Placeholder 5">
+            <a:extLst>
+              <a:ext uri="{FF2B5EF4-FFF2-40B4-BE49-F238E27FC236}">
+                <a16:creationId xmlns:a16="http://schemas.microsoft.com/office/drawing/2014/main" id="{B3C8591D-9896-1CB0-74B7-687EC2D05DE6}"/>
+              </a:ext>
+            </a:extLst>
+          </p:cNvPr>
+          <p:cNvSpPr>
+            <a:spLocks noGrp="1"/>
+          </p:cNvSpPr>
+          <p:nvPr>
+            <p:ph type="ftr" sz="quarter" idx="11"/>
+          </p:nvPr>
+        </p:nvSpPr>
+        <p:spPr/>
+        <p:txBody>
+          <a:bodyPr/>
+          <a:lstStyle/>
+          <a:p>
+            <a:r>
+              <a:rPr lang="en-GB">
+                <a:latin typeface="Times New Roman" panose="02020603050405020304" pitchFamily="18" charset="0"/>
+                <a:cs typeface="Times New Roman" panose="02020603050405020304" pitchFamily="18" charset="0"/>
+              </a:rPr>
+              <a:t>ITk Strips System Tests &amp; DAQ Meeting</a:t>
+            </a:r>
+            <a:endParaRPr lang="en-US" dirty="0">
+              <a:latin typeface="Times New Roman" panose="02020603050405020304" pitchFamily="18" charset="0"/>
+              <a:cs typeface="Times New Roman" panose="02020603050405020304" pitchFamily="18" charset="0"/>
+            </a:endParaRPr>
+          </a:p>
+        </p:txBody>
+      </p:sp>
+    </p:spTree>
+    <p:extLst>
+      <p:ext uri="{BB962C8B-B14F-4D97-AF65-F5344CB8AC3E}">
+        <p14:creationId xmlns:p14="http://schemas.microsoft.com/office/powerpoint/2010/main" val="1814212036"/>
+      </p:ext>
+    </p:extLst>
+  </p:cSld>
+  <p:clrMapOvr>
+    <a:masterClrMapping/>
+  </p:clrMapOvr>
+</p:sld>
+</file>
+
+<file path=ppt/slides/slide4.xml><?xml version="1.0" encoding="utf-8"?>
+<p:sld xmlns:a="http://schemas.openxmlformats.org/drawingml/2006/main" xmlns:r="http://schemas.openxmlformats.org/officeDocument/2006/relationships" xmlns:p="http://schemas.openxmlformats.org/presentationml/2006/main">
+  <p:cSld>
+    <p:spTree>
+      <p:nvGrpSpPr>
+        <p:cNvPr id="1" name=""/>
+        <p:cNvGrpSpPr/>
+        <p:nvPr/>
+      </p:nvGrpSpPr>
+      <p:grpSpPr>
+        <a:xfrm>
+          <a:off x="0" y="0"/>
+          <a:ext cx="0" cy="0"/>
+          <a:chOff x="0" y="0"/>
+          <a:chExt cx="0" cy="0"/>
+        </a:xfrm>
+      </p:grpSpPr>
+      <p:sp>
+        <p:nvSpPr>
+          <p:cNvPr id="2" name="Title 1">
+            <a:extLst>
+              <a:ext uri="{FF2B5EF4-FFF2-40B4-BE49-F238E27FC236}">
                 <a16:creationId xmlns:a16="http://schemas.microsoft.com/office/drawing/2014/main" id="{0964E503-31E7-5529-6A6C-2320B55BD9B2}"/>
               </a:ext>
             </a:extLst>
@@ -5484,7 +5822,7 @@
                 <a:latin typeface="Times New Roman" panose="02020603050405020304" pitchFamily="18" charset="0"/>
                 <a:cs typeface="Times New Roman" panose="02020603050405020304" pitchFamily="18" charset="0"/>
               </a:rPr>
-              <a:t>3</a:t>
+              <a:t>4</a:t>
             </a:fld>
             <a:endParaRPr lang="en-US" dirty="0">
               <a:latin typeface="Times New Roman" panose="02020603050405020304" pitchFamily="18" charset="0"/>
@@ -5753,7 +6091,7 @@
 </p:sld>
 </file>
 
-<file path=ppt/slides/slide4.xml><?xml version="1.0" encoding="utf-8"?>
+<file path=ppt/slides/slide5.xml><?xml version="1.0" encoding="utf-8"?>
 <p:sld xmlns:a="http://schemas.openxmlformats.org/drawingml/2006/main" xmlns:r="http://schemas.openxmlformats.org/officeDocument/2006/relationships" xmlns:p="http://schemas.openxmlformats.org/presentationml/2006/main">
   <p:cSld>
     <p:spTree>
@@ -5912,7 +6250,7 @@
                 <a:latin typeface="Times New Roman" panose="02020603050405020304" pitchFamily="18" charset="0"/>
                 <a:cs typeface="Times New Roman" panose="02020603050405020304" pitchFamily="18" charset="0"/>
               </a:rPr>
-              <a:t>4</a:t>
+              <a:t>5</a:t>
             </a:fld>
             <a:endParaRPr lang="en-US">
               <a:latin typeface="Times New Roman" panose="02020603050405020304" pitchFamily="18" charset="0"/>
@@ -6233,7 +6571,7 @@
 </p:sld>
 </file>
 
-<file path=ppt/slides/slide5.xml><?xml version="1.0" encoding="utf-8"?>
+<file path=ppt/slides/slide6.xml><?xml version="1.0" encoding="utf-8"?>
 <p:sld xmlns:a="http://schemas.openxmlformats.org/drawingml/2006/main" xmlns:r="http://schemas.openxmlformats.org/officeDocument/2006/relationships" xmlns:p="http://schemas.openxmlformats.org/presentationml/2006/main">
   <p:cSld>
     <p:spTree>
@@ -6454,7 +6792,7 @@
                 <a:latin typeface="Times New Roman" panose="02020603050405020304" pitchFamily="18" charset="0"/>
                 <a:cs typeface="Times New Roman" panose="02020603050405020304" pitchFamily="18" charset="0"/>
               </a:rPr>
-              <a:t>5</a:t>
+              <a:t>6</a:t>
             </a:fld>
             <a:endParaRPr lang="en-US">
               <a:latin typeface="Times New Roman" panose="02020603050405020304" pitchFamily="18" charset="0"/>
@@ -7018,7 +7356,7 @@
 </p:sld>
 </file>
 
-<file path=ppt/slides/slide6.xml><?xml version="1.0" encoding="utf-8"?>
+<file path=ppt/slides/slide7.xml><?xml version="1.0" encoding="utf-8"?>
 <p:sld xmlns:a="http://schemas.openxmlformats.org/drawingml/2006/main" xmlns:r="http://schemas.openxmlformats.org/officeDocument/2006/relationships" xmlns:p="http://schemas.openxmlformats.org/presentationml/2006/main">
   <p:cSld>
     <p:spTree>
@@ -7208,7 +7546,7 @@
                 <a:latin typeface="Times New Roman" panose="02020603050405020304" pitchFamily="18" charset="0"/>
                 <a:cs typeface="Times New Roman" panose="02020603050405020304" pitchFamily="18" charset="0"/>
               </a:rPr>
-              <a:t>6</a:t>
+              <a:t>7</a:t>
             </a:fld>
             <a:endParaRPr lang="en-US">
               <a:latin typeface="Times New Roman" panose="02020603050405020304" pitchFamily="18" charset="0"/>
@@ -7565,7 +7903,7 @@
 </p:sld>
 </file>
 
-<file path=ppt/slides/slide7.xml><?xml version="1.0" encoding="utf-8"?>
+<file path=ppt/slides/slide8.xml><?xml version="1.0" encoding="utf-8"?>
 <p:sld xmlns:a="http://schemas.openxmlformats.org/drawingml/2006/main" xmlns:r="http://schemas.openxmlformats.org/officeDocument/2006/relationships" xmlns:p="http://schemas.openxmlformats.org/presentationml/2006/main">
   <p:cSld>
     <p:spTree>
@@ -7813,7 +8151,7 @@
                 <a:latin typeface="Times New Roman" panose="02020603050405020304" pitchFamily="18" charset="0"/>
                 <a:cs typeface="Times New Roman" panose="02020603050405020304" pitchFamily="18" charset="0"/>
               </a:rPr>
-              <a:t>7</a:t>
+              <a:t>8</a:t>
             </a:fld>
             <a:endParaRPr lang="en-US" dirty="0">
               <a:latin typeface="Times New Roman" panose="02020603050405020304" pitchFamily="18" charset="0"/>

</xml_diff>